<commit_message>
Update design files and images
</commit_message>
<xml_diff>
--- a/Robot/Doc/Media/Design_Future_2018/August-6-2018-Design_Full.pptx
+++ b/Robot/Doc/Media/Design_Future_2018/August-6-2018-Design_Full.pptx
@@ -243,7 +243,7 @@
           <a:p>
             <a:fld id="{661CBB55-5844-4F0B-9F21-ACF5478787D6}" type="datetimeFigureOut">
               <a:rPr lang="en-CA" smtClean="0"/>
-              <a:t>2018-08-06</a:t>
+              <a:t>2018-09-15</a:t>
             </a:fld>
             <a:endParaRPr lang="en-CA"/>
           </a:p>
@@ -413,7 +413,7 @@
           <a:p>
             <a:fld id="{661CBB55-5844-4F0B-9F21-ACF5478787D6}" type="datetimeFigureOut">
               <a:rPr lang="en-CA" smtClean="0"/>
-              <a:t>2018-08-06</a:t>
+              <a:t>2018-09-15</a:t>
             </a:fld>
             <a:endParaRPr lang="en-CA"/>
           </a:p>
@@ -593,7 +593,7 @@
           <a:p>
             <a:fld id="{661CBB55-5844-4F0B-9F21-ACF5478787D6}" type="datetimeFigureOut">
               <a:rPr lang="en-CA" smtClean="0"/>
-              <a:t>2018-08-06</a:t>
+              <a:t>2018-09-15</a:t>
             </a:fld>
             <a:endParaRPr lang="en-CA"/>
           </a:p>
@@ -763,7 +763,7 @@
           <a:p>
             <a:fld id="{661CBB55-5844-4F0B-9F21-ACF5478787D6}" type="datetimeFigureOut">
               <a:rPr lang="en-CA" smtClean="0"/>
-              <a:t>2018-08-06</a:t>
+              <a:t>2018-09-15</a:t>
             </a:fld>
             <a:endParaRPr lang="en-CA"/>
           </a:p>
@@ -1009,7 +1009,7 @@
           <a:p>
             <a:fld id="{661CBB55-5844-4F0B-9F21-ACF5478787D6}" type="datetimeFigureOut">
               <a:rPr lang="en-CA" smtClean="0"/>
-              <a:t>2018-08-06</a:t>
+              <a:t>2018-09-15</a:t>
             </a:fld>
             <a:endParaRPr lang="en-CA"/>
           </a:p>
@@ -1241,7 +1241,7 @@
           <a:p>
             <a:fld id="{661CBB55-5844-4F0B-9F21-ACF5478787D6}" type="datetimeFigureOut">
               <a:rPr lang="en-CA" smtClean="0"/>
-              <a:t>2018-08-06</a:t>
+              <a:t>2018-09-15</a:t>
             </a:fld>
             <a:endParaRPr lang="en-CA"/>
           </a:p>
@@ -1608,7 +1608,7 @@
           <a:p>
             <a:fld id="{661CBB55-5844-4F0B-9F21-ACF5478787D6}" type="datetimeFigureOut">
               <a:rPr lang="en-CA" smtClean="0"/>
-              <a:t>2018-08-06</a:t>
+              <a:t>2018-09-15</a:t>
             </a:fld>
             <a:endParaRPr lang="en-CA"/>
           </a:p>
@@ -1726,7 +1726,7 @@
           <a:p>
             <a:fld id="{661CBB55-5844-4F0B-9F21-ACF5478787D6}" type="datetimeFigureOut">
               <a:rPr lang="en-CA" smtClean="0"/>
-              <a:t>2018-08-06</a:t>
+              <a:t>2018-09-15</a:t>
             </a:fld>
             <a:endParaRPr lang="en-CA"/>
           </a:p>
@@ -1821,7 +1821,7 @@
           <a:p>
             <a:fld id="{661CBB55-5844-4F0B-9F21-ACF5478787D6}" type="datetimeFigureOut">
               <a:rPr lang="en-CA" smtClean="0"/>
-              <a:t>2018-08-06</a:t>
+              <a:t>2018-09-15</a:t>
             </a:fld>
             <a:endParaRPr lang="en-CA"/>
           </a:p>
@@ -2098,7 +2098,7 @@
           <a:p>
             <a:fld id="{661CBB55-5844-4F0B-9F21-ACF5478787D6}" type="datetimeFigureOut">
               <a:rPr lang="en-CA" smtClean="0"/>
-              <a:t>2018-08-06</a:t>
+              <a:t>2018-09-15</a:t>
             </a:fld>
             <a:endParaRPr lang="en-CA"/>
           </a:p>
@@ -2355,7 +2355,7 @@
           <a:p>
             <a:fld id="{661CBB55-5844-4F0B-9F21-ACF5478787D6}" type="datetimeFigureOut">
               <a:rPr lang="en-CA" smtClean="0"/>
-              <a:t>2018-08-06</a:t>
+              <a:t>2018-09-15</a:t>
             </a:fld>
             <a:endParaRPr lang="en-CA"/>
           </a:p>
@@ -2568,7 +2568,7 @@
           <a:p>
             <a:fld id="{661CBB55-5844-4F0B-9F21-ACF5478787D6}" type="datetimeFigureOut">
               <a:rPr lang="en-CA" smtClean="0"/>
-              <a:t>2018-08-06</a:t>
+              <a:t>2018-09-15</a:t>
             </a:fld>
             <a:endParaRPr lang="en-CA"/>
           </a:p>
@@ -9618,120 +9618,62 @@
           </a:p>
         </p:txBody>
       </p:sp>
-      <p:grpSp>
-        <p:nvGrpSpPr>
-          <p:cNvPr id="246" name="Group 245">
-            <a:extLst>
-              <a:ext uri="{FF2B5EF4-FFF2-40B4-BE49-F238E27FC236}">
-                <a16:creationId xmlns:a16="http://schemas.microsoft.com/office/drawing/2014/main" id="{6BB91E7F-C3FA-4C6B-884D-BD4CEB01E5BC}"/>
-              </a:ext>
-            </a:extLst>
-          </p:cNvPr>
-          <p:cNvGrpSpPr/>
-          <p:nvPr/>
-        </p:nvGrpSpPr>
-        <p:grpSpPr>
-          <a:xfrm>
-            <a:off x="4234324" y="5977762"/>
-            <a:ext cx="1581784" cy="1431489"/>
-            <a:chOff x="4234324" y="5977762"/>
-            <a:chExt cx="1581784" cy="1431489"/>
-          </a:xfrm>
-        </p:grpSpPr>
-        <p:sp>
-          <p:nvSpPr>
-            <p:cNvPr id="175" name="Rectangle: Rounded Corners 174">
-              <a:extLst>
-                <a:ext uri="{FF2B5EF4-FFF2-40B4-BE49-F238E27FC236}">
-                  <a16:creationId xmlns:a16="http://schemas.microsoft.com/office/drawing/2014/main" id="{3BDB3517-A51C-446D-953D-AF27BDB8653F}"/>
-                </a:ext>
-              </a:extLst>
-            </p:cNvPr>
-            <p:cNvSpPr/>
-            <p:nvPr/>
-          </p:nvSpPr>
-          <p:spPr>
-            <a:xfrm>
-              <a:off x="4234324" y="5977762"/>
-              <a:ext cx="1581784" cy="1431489"/>
-            </a:xfrm>
-            <a:prstGeom prst="roundRect">
-              <a:avLst/>
-            </a:prstGeom>
+      <p:sp>
+        <p:nvSpPr>
+          <p:cNvPr id="175" name="Rectangle: Rounded Corners 174">
+            <a:extLst>
+              <a:ext uri="{FF2B5EF4-FFF2-40B4-BE49-F238E27FC236}">
+                <a16:creationId xmlns:a16="http://schemas.microsoft.com/office/drawing/2014/main" id="{3BDB3517-A51C-446D-953D-AF27BDB8653F}"/>
+              </a:ext>
+            </a:extLst>
+          </p:cNvPr>
+          <p:cNvSpPr/>
+          <p:nvPr/>
+        </p:nvSpPr>
+        <p:spPr>
+          <a:xfrm>
+            <a:off x="5544747" y="5977762"/>
+            <a:ext cx="271361" cy="251953"/>
+          </a:xfrm>
+          <a:prstGeom prst="roundRect">
+            <a:avLst/>
+          </a:prstGeom>
+          <a:solidFill>
+            <a:schemeClr val="accent2">
+              <a:alpha val="42000"/>
+            </a:schemeClr>
+          </a:solidFill>
+          <a:ln>
             <a:solidFill>
-              <a:schemeClr val="bg1">
-                <a:lumMod val="65000"/>
-                <a:alpha val="42000"/>
-              </a:schemeClr>
+              <a:schemeClr val="tx1"/>
             </a:solidFill>
-            <a:ln>
-              <a:solidFill>
-                <a:schemeClr val="tx1"/>
-              </a:solidFill>
-            </a:ln>
-          </p:spPr>
-          <p:style>
-            <a:lnRef idx="2">
-              <a:schemeClr val="accent1">
-                <a:shade val="50000"/>
-              </a:schemeClr>
-            </a:lnRef>
-            <a:fillRef idx="1">
-              <a:schemeClr val="accent1"/>
-            </a:fillRef>
-            <a:effectRef idx="0">
-              <a:schemeClr val="accent1"/>
-            </a:effectRef>
-            <a:fontRef idx="minor">
-              <a:schemeClr val="lt1"/>
-            </a:fontRef>
-          </p:style>
-          <p:txBody>
-            <a:bodyPr rtlCol="0" anchor="ctr"/>
-            <a:lstStyle/>
-            <a:p>
-              <a:pPr algn="ctr"/>
-              <a:endParaRPr lang="en-CA"/>
-            </a:p>
-          </p:txBody>
-        </p:sp>
-        <p:sp>
-          <p:nvSpPr>
-            <p:cNvPr id="178" name="TextBox 177">
-              <a:extLst>
-                <a:ext uri="{FF2B5EF4-FFF2-40B4-BE49-F238E27FC236}">
-                  <a16:creationId xmlns:a16="http://schemas.microsoft.com/office/drawing/2014/main" id="{ED2E2D72-D452-4B2B-AF3E-6E197B9908C3}"/>
-                </a:ext>
-              </a:extLst>
-            </p:cNvPr>
-            <p:cNvSpPr txBox="1"/>
-            <p:nvPr/>
-          </p:nvSpPr>
-          <p:spPr>
-            <a:xfrm>
-              <a:off x="4234324" y="6008393"/>
-              <a:ext cx="1581784" cy="646331"/>
-            </a:xfrm>
-            <a:prstGeom prst="rect">
-              <a:avLst/>
-            </a:prstGeom>
-            <a:noFill/>
-          </p:spPr>
-          <p:txBody>
-            <a:bodyPr wrap="square" rtlCol="0">
-              <a:spAutoFit/>
-            </a:bodyPr>
-            <a:lstStyle/>
-            <a:p>
-              <a:pPr algn="ctr"/>
-              <a:r>
-                <a:rPr lang="en-CA" b="1" dirty="0"/>
-                <a:t>Equipment handler</a:t>
-              </a:r>
-            </a:p>
-          </p:txBody>
-        </p:sp>
-      </p:grpSp>
+          </a:ln>
+        </p:spPr>
+        <p:style>
+          <a:lnRef idx="2">
+            <a:schemeClr val="accent1">
+              <a:shade val="50000"/>
+            </a:schemeClr>
+          </a:lnRef>
+          <a:fillRef idx="1">
+            <a:schemeClr val="accent1"/>
+          </a:fillRef>
+          <a:effectRef idx="0">
+            <a:schemeClr val="accent1"/>
+          </a:effectRef>
+          <a:fontRef idx="minor">
+            <a:schemeClr val="lt1"/>
+          </a:fontRef>
+        </p:style>
+        <p:txBody>
+          <a:bodyPr rtlCol="0" anchor="ctr"/>
+          <a:lstStyle/>
+          <a:p>
+            <a:pPr algn="ctr"/>
+            <a:endParaRPr lang="en-CA"/>
+          </a:p>
+        </p:txBody>
+      </p:sp>
       <p:cxnSp>
         <p:nvCxnSpPr>
           <p:cNvPr id="179" name="Straight Arrow Connector 178">
@@ -9822,7 +9764,7 @@
             <a:pPr algn="ctr"/>
             <a:r>
               <a:rPr lang="en-CA" dirty="0"/>
-              <a:t>Update equipment command cache</a:t>
+              <a:t>Equipment handler</a:t>
             </a:r>
           </a:p>
         </p:txBody>
@@ -9933,20 +9875,19 @@
           </p:cNvPr>
           <p:cNvCxnSpPr>
             <a:cxnSpLocks/>
-            <a:stCxn id="178" idx="3"/>
+            <a:stCxn id="175" idx="0"/>
             <a:endCxn id="29" idx="0"/>
           </p:cNvCxnSpPr>
           <p:nvPr/>
         </p:nvCxnSpPr>
         <p:spPr>
-          <a:xfrm flipV="1">
-            <a:off x="5816108" y="5623701"/>
-            <a:ext cx="5653366" cy="707858"/>
-          </a:xfrm>
-          <a:prstGeom prst="curvedConnector4">
+          <a:xfrm rot="5400000" flipH="1" flipV="1">
+            <a:off x="8397921" y="2906209"/>
+            <a:ext cx="354061" cy="5789046"/>
+          </a:xfrm>
+          <a:prstGeom prst="curvedConnector3">
             <a:avLst>
-              <a:gd name="adj1" fmla="val 48036"/>
-              <a:gd name="adj2" fmla="val 256568"/>
+              <a:gd name="adj1" fmla="val 164565"/>
             </a:avLst>
           </a:prstGeom>
           <a:ln w="25400">
@@ -9982,20 +9923,19 @@
           </p:cNvPr>
           <p:cNvCxnSpPr>
             <a:cxnSpLocks/>
-            <a:stCxn id="178" idx="3"/>
+            <a:stCxn id="175" idx="0"/>
             <a:endCxn id="29" idx="0"/>
           </p:cNvCxnSpPr>
           <p:nvPr/>
         </p:nvCxnSpPr>
         <p:spPr>
-          <a:xfrm flipV="1">
-            <a:off x="5816108" y="5623701"/>
-            <a:ext cx="5653366" cy="707858"/>
-          </a:xfrm>
-          <a:prstGeom prst="curvedConnector4">
+          <a:xfrm rot="5400000" flipH="1" flipV="1">
+            <a:off x="8397921" y="2906209"/>
+            <a:ext cx="354061" cy="5789046"/>
+          </a:xfrm>
+          <a:prstGeom prst="curvedConnector3">
             <a:avLst>
-              <a:gd name="adj1" fmla="val 48036"/>
-              <a:gd name="adj2" fmla="val 235311"/>
+              <a:gd name="adj1" fmla="val 164565"/>
             </a:avLst>
           </a:prstGeom>
           <a:ln w="25400">
@@ -10031,20 +9971,19 @@
           </p:cNvPr>
           <p:cNvCxnSpPr>
             <a:cxnSpLocks/>
-            <a:stCxn id="178" idx="3"/>
+            <a:stCxn id="175" idx="0"/>
             <a:endCxn id="29" idx="0"/>
           </p:cNvCxnSpPr>
           <p:nvPr/>
         </p:nvCxnSpPr>
         <p:spPr>
-          <a:xfrm flipV="1">
-            <a:off x="5816108" y="5623701"/>
-            <a:ext cx="5653366" cy="707858"/>
-          </a:xfrm>
-          <a:prstGeom prst="curvedConnector4">
+          <a:xfrm rot="5400000" flipH="1" flipV="1">
+            <a:off x="8397921" y="2906209"/>
+            <a:ext cx="354061" cy="5789046"/>
+          </a:xfrm>
+          <a:prstGeom prst="curvedConnector3">
             <a:avLst>
-              <a:gd name="adj1" fmla="val 48036"/>
-              <a:gd name="adj2" fmla="val 269649"/>
+              <a:gd name="adj1" fmla="val 164565"/>
             </a:avLst>
           </a:prstGeom>
           <a:ln w="25400">
@@ -10087,12 +10026,12 @@
         </p:nvCxnSpPr>
         <p:spPr>
           <a:xfrm>
-            <a:off x="5816108" y="6693507"/>
-            <a:ext cx="5431238" cy="841722"/>
+            <a:off x="5816108" y="6103739"/>
+            <a:ext cx="5431238" cy="1431490"/>
           </a:xfrm>
           <a:prstGeom prst="curvedConnector3">
             <a:avLst>
-              <a:gd name="adj1" fmla="val 94335"/>
+              <a:gd name="adj1" fmla="val 50000"/>
             </a:avLst>
           </a:prstGeom>
           <a:ln w="25400">
@@ -10135,12 +10074,12 @@
         </p:nvCxnSpPr>
         <p:spPr>
           <a:xfrm>
-            <a:off x="5816108" y="6693507"/>
-            <a:ext cx="5431238" cy="841722"/>
+            <a:off x="5816108" y="6103739"/>
+            <a:ext cx="5431238" cy="1431490"/>
           </a:xfrm>
           <a:prstGeom prst="curvedConnector3">
             <a:avLst>
-              <a:gd name="adj1" fmla="val 90182"/>
+              <a:gd name="adj1" fmla="val 50000"/>
             </a:avLst>
           </a:prstGeom>
           <a:ln w="25400">
@@ -10183,12 +10122,12 @@
         </p:nvCxnSpPr>
         <p:spPr>
           <a:xfrm>
-            <a:off x="5816108" y="6693507"/>
-            <a:ext cx="5431238" cy="841722"/>
+            <a:off x="5816108" y="6103739"/>
+            <a:ext cx="5431238" cy="1431490"/>
           </a:xfrm>
           <a:prstGeom prst="curvedConnector3">
             <a:avLst>
-              <a:gd name="adj1" fmla="val 91977"/>
+              <a:gd name="adj1" fmla="val 50000"/>
             </a:avLst>
           </a:prstGeom>
           <a:ln w="25400">
@@ -10231,12 +10170,12 @@
         </p:nvCxnSpPr>
         <p:spPr>
           <a:xfrm rot="16200000" flipH="1">
-            <a:off x="6360689" y="6073778"/>
-            <a:ext cx="3773291" cy="6444236"/>
+            <a:off x="6098527" y="5811616"/>
+            <a:ext cx="4952827" cy="5789024"/>
           </a:xfrm>
           <a:prstGeom prst="curvedConnector3">
             <a:avLst>
-              <a:gd name="adj1" fmla="val 106058"/>
+              <a:gd name="adj1" fmla="val 104616"/>
             </a:avLst>
           </a:prstGeom>
           <a:ln w="25400">
@@ -10279,12 +10218,12 @@
         </p:nvCxnSpPr>
         <p:spPr>
           <a:xfrm rot="16200000" flipH="1">
-            <a:off x="6360689" y="6073778"/>
-            <a:ext cx="3773291" cy="6444236"/>
+            <a:off x="6098527" y="5811616"/>
+            <a:ext cx="4952827" cy="5789024"/>
           </a:xfrm>
           <a:prstGeom prst="curvedConnector3">
             <a:avLst>
-              <a:gd name="adj1" fmla="val 112193"/>
+              <a:gd name="adj1" fmla="val 104616"/>
             </a:avLst>
           </a:prstGeom>
           <a:ln w="25400">
@@ -10327,12 +10266,12 @@
         </p:nvCxnSpPr>
         <p:spPr>
           <a:xfrm rot="16200000" flipH="1">
-            <a:off x="6360689" y="6073778"/>
-            <a:ext cx="3773291" cy="6444236"/>
+            <a:off x="6098527" y="5811616"/>
+            <a:ext cx="4952827" cy="5789024"/>
           </a:xfrm>
           <a:prstGeom prst="curvedConnector3">
             <a:avLst>
-              <a:gd name="adj1" fmla="val 108512"/>
+              <a:gd name="adj1" fmla="val 104616"/>
             </a:avLst>
           </a:prstGeom>
           <a:ln w="25400">
@@ -10375,12 +10314,12 @@
         </p:nvCxnSpPr>
         <p:spPr>
           <a:xfrm rot="16200000" flipH="1">
-            <a:off x="5299116" y="7135350"/>
-            <a:ext cx="5896424" cy="6444225"/>
+            <a:off x="5036954" y="6873188"/>
+            <a:ext cx="7075960" cy="5789013"/>
           </a:xfrm>
           <a:prstGeom prst="curvedConnector3">
             <a:avLst>
-              <a:gd name="adj1" fmla="val 103877"/>
+              <a:gd name="adj1" fmla="val 103231"/>
             </a:avLst>
           </a:prstGeom>
           <a:ln w="25400">
@@ -10423,12 +10362,12 @@
         </p:nvCxnSpPr>
         <p:spPr>
           <a:xfrm rot="16200000" flipH="1">
-            <a:off x="5299116" y="7135350"/>
-            <a:ext cx="5896424" cy="6444225"/>
+            <a:off x="5036954" y="6873188"/>
+            <a:ext cx="7075960" cy="5789013"/>
           </a:xfrm>
           <a:prstGeom prst="curvedConnector3">
             <a:avLst>
-              <a:gd name="adj1" fmla="val 105447"/>
+              <a:gd name="adj1" fmla="val 103231"/>
             </a:avLst>
           </a:prstGeom>
           <a:ln w="25400">
@@ -10471,12 +10410,12 @@
         </p:nvCxnSpPr>
         <p:spPr>
           <a:xfrm rot="16200000" flipH="1">
-            <a:off x="5299116" y="7135350"/>
-            <a:ext cx="5896424" cy="6444225"/>
+            <a:off x="5036954" y="6873188"/>
+            <a:ext cx="7075960" cy="5789013"/>
           </a:xfrm>
           <a:prstGeom prst="curvedConnector3">
             <a:avLst>
-              <a:gd name="adj1" fmla="val 106821"/>
+              <a:gd name="adj1" fmla="val 103231"/>
             </a:avLst>
           </a:prstGeom>
           <a:ln w="25400">
@@ -10551,55 +10490,6 @@
           </a:fontRef>
         </p:style>
       </p:cxnSp>
-      <p:cxnSp>
-        <p:nvCxnSpPr>
-          <p:cNvPr id="286" name="Connector: Curved 285">
-            <a:extLst>
-              <a:ext uri="{FF2B5EF4-FFF2-40B4-BE49-F238E27FC236}">
-                <a16:creationId xmlns:a16="http://schemas.microsoft.com/office/drawing/2014/main" id="{4E643169-7FD8-4296-977E-3D4172C9B8FE}"/>
-              </a:ext>
-            </a:extLst>
-          </p:cNvPr>
-          <p:cNvCxnSpPr>
-            <a:cxnSpLocks/>
-            <a:stCxn id="180" idx="2"/>
-            <a:endCxn id="298" idx="3"/>
-          </p:cNvCxnSpPr>
-          <p:nvPr/>
-        </p:nvCxnSpPr>
-        <p:spPr>
-          <a:xfrm rot="5400000" flipH="1">
-            <a:off x="9748610" y="1286904"/>
-            <a:ext cx="585787" cy="2125793"/>
-          </a:xfrm>
-          <a:prstGeom prst="curvedConnector4">
-            <a:avLst>
-              <a:gd name="adj1" fmla="val -39024"/>
-              <a:gd name="adj2" fmla="val 69672"/>
-            </a:avLst>
-          </a:prstGeom>
-          <a:ln w="25400">
-            <a:solidFill>
-              <a:schemeClr val="tx1"/>
-            </a:solidFill>
-            <a:tailEnd type="triangle"/>
-          </a:ln>
-        </p:spPr>
-        <p:style>
-          <a:lnRef idx="1">
-            <a:schemeClr val="accent1"/>
-          </a:lnRef>
-          <a:fillRef idx="0">
-            <a:schemeClr val="accent1"/>
-          </a:fillRef>
-          <a:effectRef idx="0">
-            <a:schemeClr val="accent1"/>
-          </a:effectRef>
-          <a:fontRef idx="minor">
-            <a:schemeClr val="tx1"/>
-          </a:fontRef>
-        </p:style>
-      </p:cxnSp>
       <p:sp>
         <p:nvSpPr>
           <p:cNvPr id="345" name="Flowchart: Predefined Process 344">
@@ -10614,7 +10504,7 @@
         </p:nvSpPr>
         <p:spPr>
           <a:xfrm>
-            <a:off x="12757864" y="1435384"/>
+            <a:off x="12757864" y="1471118"/>
             <a:ext cx="1672701" cy="1171575"/>
           </a:xfrm>
           <a:prstGeom prst="flowChartPredefinedProcess">
@@ -10649,55 +10539,6 @@
           </a:p>
         </p:txBody>
       </p:sp>
-      <p:cxnSp>
-        <p:nvCxnSpPr>
-          <p:cNvPr id="367" name="Connector: Curved 366">
-            <a:extLst>
-              <a:ext uri="{FF2B5EF4-FFF2-40B4-BE49-F238E27FC236}">
-                <a16:creationId xmlns:a16="http://schemas.microsoft.com/office/drawing/2014/main" id="{A5ED6B20-ECD5-4ACC-82F4-6A4579E2B94D}"/>
-              </a:ext>
-            </a:extLst>
-          </p:cNvPr>
-          <p:cNvCxnSpPr>
-            <a:cxnSpLocks/>
-            <a:stCxn id="180" idx="2"/>
-            <a:endCxn id="345" idx="1"/>
-          </p:cNvCxnSpPr>
-          <p:nvPr/>
-        </p:nvCxnSpPr>
-        <p:spPr>
-          <a:xfrm rot="5400000" flipH="1" flipV="1">
-            <a:off x="11620371" y="1505201"/>
-            <a:ext cx="621521" cy="1653464"/>
-          </a:xfrm>
-          <a:prstGeom prst="curvedConnector4">
-            <a:avLst>
-              <a:gd name="adj1" fmla="val -163419"/>
-              <a:gd name="adj2" fmla="val 75291"/>
-            </a:avLst>
-          </a:prstGeom>
-          <a:ln w="25400">
-            <a:solidFill>
-              <a:schemeClr val="tx1"/>
-            </a:solidFill>
-            <a:tailEnd type="triangle"/>
-          </a:ln>
-        </p:spPr>
-        <p:style>
-          <a:lnRef idx="1">
-            <a:schemeClr val="accent1"/>
-          </a:lnRef>
-          <a:fillRef idx="0">
-            <a:schemeClr val="accent1"/>
-          </a:fillRef>
-          <a:effectRef idx="0">
-            <a:schemeClr val="accent1"/>
-          </a:effectRef>
-          <a:fontRef idx="minor">
-            <a:schemeClr val="tx1"/>
-          </a:fontRef>
-        </p:style>
-      </p:cxnSp>
       <p:sp>
         <p:nvSpPr>
           <p:cNvPr id="370" name="Rectangle: Rounded Corners 369">
@@ -11070,12 +10911,12 @@
         </p:nvCxnSpPr>
         <p:spPr>
           <a:xfrm rot="16200000" flipH="1">
-            <a:off x="16090017" y="111156"/>
-            <a:ext cx="2888988" cy="7880593"/>
+            <a:off x="16107884" y="129023"/>
+            <a:ext cx="2853254" cy="7880593"/>
           </a:xfrm>
           <a:prstGeom prst="curvedConnector3">
             <a:avLst>
-              <a:gd name="adj1" fmla="val 72724"/>
+              <a:gd name="adj1" fmla="val 50000"/>
             </a:avLst>
           </a:prstGeom>
           <a:ln w="25400">
@@ -11119,7 +10960,7 @@
         <p:spPr>
           <a:xfrm flipV="1">
             <a:off x="14430565" y="1652178"/>
-            <a:ext cx="4893965" cy="368994"/>
+            <a:ext cx="4893965" cy="404728"/>
           </a:xfrm>
           <a:prstGeom prst="curvedConnector3">
             <a:avLst>
@@ -12497,12 +12338,12 @@
         </p:nvCxnSpPr>
         <p:spPr>
           <a:xfrm>
-            <a:off x="5816108" y="6693507"/>
-            <a:ext cx="5428939" cy="2630641"/>
+            <a:off x="5816108" y="6103739"/>
+            <a:ext cx="5428939" cy="3220409"/>
           </a:xfrm>
           <a:prstGeom prst="curvedConnector3">
             <a:avLst>
-              <a:gd name="adj1" fmla="val 29414"/>
+              <a:gd name="adj1" fmla="val 50000"/>
             </a:avLst>
           </a:prstGeom>
           <a:ln w="25400">
@@ -12537,6 +12378,7 @@
             </a:extLst>
           </p:cNvPr>
           <p:cNvCxnSpPr>
+            <a:cxnSpLocks/>
             <a:stCxn id="175" idx="3"/>
             <a:endCxn id="195" idx="1"/>
           </p:cNvCxnSpPr>
@@ -12544,12 +12386,12 @@
         </p:nvCxnSpPr>
         <p:spPr>
           <a:xfrm>
-            <a:off x="5816108" y="6693507"/>
-            <a:ext cx="5428939" cy="2630641"/>
+            <a:off x="5816108" y="6103739"/>
+            <a:ext cx="5428939" cy="3220409"/>
           </a:xfrm>
           <a:prstGeom prst="curvedConnector3">
             <a:avLst>
-              <a:gd name="adj1" fmla="val 31473"/>
+              <a:gd name="adj1" fmla="val 50000"/>
             </a:avLst>
           </a:prstGeom>
           <a:ln w="25400">
@@ -12584,6 +12426,7 @@
             </a:extLst>
           </p:cNvPr>
           <p:cNvCxnSpPr>
+            <a:cxnSpLocks/>
             <a:stCxn id="175" idx="3"/>
             <a:endCxn id="195" idx="1"/>
           </p:cNvCxnSpPr>
@@ -12591,12 +12434,12 @@
         </p:nvCxnSpPr>
         <p:spPr>
           <a:xfrm>
-            <a:off x="5816108" y="6693507"/>
-            <a:ext cx="5428939" cy="2630641"/>
+            <a:off x="5816108" y="6103739"/>
+            <a:ext cx="5428939" cy="3220409"/>
           </a:xfrm>
           <a:prstGeom prst="curvedConnector3">
             <a:avLst>
-              <a:gd name="adj1" fmla="val 33531"/>
+              <a:gd name="adj1" fmla="val 50000"/>
             </a:avLst>
           </a:prstGeom>
           <a:ln w="25400">
@@ -12639,12 +12482,12 @@
         </p:nvCxnSpPr>
         <p:spPr>
           <a:xfrm>
-            <a:off x="5816108" y="6693507"/>
-            <a:ext cx="5428939" cy="2630641"/>
+            <a:off x="5816108" y="6103739"/>
+            <a:ext cx="5428939" cy="3220409"/>
           </a:xfrm>
           <a:prstGeom prst="curvedConnector3">
             <a:avLst>
-              <a:gd name="adj1" fmla="val 35515"/>
+              <a:gd name="adj1" fmla="val 50000"/>
             </a:avLst>
           </a:prstGeom>
           <a:ln w="25400">
@@ -12679,6 +12522,7 @@
             </a:extLst>
           </p:cNvPr>
           <p:cNvCxnSpPr>
+            <a:cxnSpLocks/>
             <a:stCxn id="175" idx="3"/>
             <a:endCxn id="195" idx="1"/>
           </p:cNvCxnSpPr>
@@ -12686,12 +12530,12 @@
         </p:nvCxnSpPr>
         <p:spPr>
           <a:xfrm>
-            <a:off x="5816108" y="6693507"/>
-            <a:ext cx="5428939" cy="2630641"/>
+            <a:off x="5816108" y="6103739"/>
+            <a:ext cx="5428939" cy="3220409"/>
           </a:xfrm>
           <a:prstGeom prst="curvedConnector3">
             <a:avLst>
-              <a:gd name="adj1" fmla="val 37087"/>
+              <a:gd name="adj1" fmla="val 50000"/>
             </a:avLst>
           </a:prstGeom>
           <a:ln w="25400">
@@ -12726,6 +12570,7 @@
             </a:extLst>
           </p:cNvPr>
           <p:cNvCxnSpPr>
+            <a:cxnSpLocks/>
             <a:stCxn id="175" idx="3"/>
             <a:endCxn id="195" idx="1"/>
           </p:cNvCxnSpPr>
@@ -12733,12 +12578,12 @@
         </p:nvCxnSpPr>
         <p:spPr>
           <a:xfrm>
-            <a:off x="5816108" y="6693507"/>
-            <a:ext cx="5428939" cy="2630641"/>
+            <a:off x="5816108" y="6103739"/>
+            <a:ext cx="5428939" cy="3220409"/>
           </a:xfrm>
           <a:prstGeom prst="curvedConnector3">
             <a:avLst>
-              <a:gd name="adj1" fmla="val 38771"/>
+              <a:gd name="adj1" fmla="val 50000"/>
             </a:avLst>
           </a:prstGeom>
           <a:ln w="25400">
@@ -14099,143 +13944,30 @@
           </p:txBody>
         </p:sp>
       </p:grpSp>
-      <p:grpSp>
-        <p:nvGrpSpPr>
-          <p:cNvPr id="149" name="Group 148">
-            <a:extLst>
-              <a:ext uri="{FF2B5EF4-FFF2-40B4-BE49-F238E27FC236}">
-                <a16:creationId xmlns:a16="http://schemas.microsoft.com/office/drawing/2014/main" id="{9C8A5ACC-0DA2-4E68-A3D3-7BB07A357D29}"/>
-              </a:ext>
-            </a:extLst>
-          </p:cNvPr>
-          <p:cNvGrpSpPr/>
-          <p:nvPr/>
-        </p:nvGrpSpPr>
-        <p:grpSpPr>
-          <a:xfrm>
-            <a:off x="4699808" y="541060"/>
-            <a:ext cx="4278799" cy="3031692"/>
-            <a:chOff x="4487440" y="1038459"/>
-            <a:chExt cx="4278799" cy="3080909"/>
-          </a:xfrm>
-        </p:grpSpPr>
-        <p:sp>
-          <p:nvSpPr>
-            <p:cNvPr id="298" name="Rectangle: Rounded Corners 297">
-              <a:extLst>
-                <a:ext uri="{FF2B5EF4-FFF2-40B4-BE49-F238E27FC236}">
-                  <a16:creationId xmlns:a16="http://schemas.microsoft.com/office/drawing/2014/main" id="{A9B9B68A-FC63-4F65-9744-E0BEA1775907}"/>
-                </a:ext>
-              </a:extLst>
-            </p:cNvPr>
-            <p:cNvSpPr/>
-            <p:nvPr/>
-          </p:nvSpPr>
-          <p:spPr>
-            <a:xfrm>
-              <a:off x="4487440" y="1038459"/>
-              <a:ext cx="4278799" cy="3080909"/>
-            </a:xfrm>
-            <a:prstGeom prst="roundRect">
-              <a:avLst/>
-            </a:prstGeom>
-            <a:solidFill>
-              <a:srgbClr val="7030A0">
-                <a:alpha val="42000"/>
-              </a:srgbClr>
-            </a:solidFill>
-            <a:ln>
-              <a:solidFill>
-                <a:schemeClr val="tx1"/>
-              </a:solidFill>
-            </a:ln>
-          </p:spPr>
-          <p:style>
-            <a:lnRef idx="2">
-              <a:schemeClr val="accent1">
-                <a:shade val="50000"/>
-              </a:schemeClr>
-            </a:lnRef>
-            <a:fillRef idx="1">
-              <a:schemeClr val="accent1"/>
-            </a:fillRef>
-            <a:effectRef idx="0">
-              <a:schemeClr val="accent1"/>
-            </a:effectRef>
-            <a:fontRef idx="minor">
-              <a:schemeClr val="lt1"/>
-            </a:fontRef>
-          </p:style>
-          <p:txBody>
-            <a:bodyPr rtlCol="0" anchor="ctr"/>
-            <a:lstStyle/>
-            <a:p>
-              <a:pPr algn="ctr"/>
-              <a:endParaRPr lang="en-CA" dirty="0"/>
-            </a:p>
-          </p:txBody>
-        </p:sp>
-        <p:sp>
-          <p:nvSpPr>
-            <p:cNvPr id="299" name="TextBox 298">
-              <a:extLst>
-                <a:ext uri="{FF2B5EF4-FFF2-40B4-BE49-F238E27FC236}">
-                  <a16:creationId xmlns:a16="http://schemas.microsoft.com/office/drawing/2014/main" id="{9E0DAE5F-D6E2-44D5-98C9-1328C8549D89}"/>
-                </a:ext>
-              </a:extLst>
-            </p:cNvPr>
-            <p:cNvSpPr txBox="1"/>
-            <p:nvPr/>
-          </p:nvSpPr>
-          <p:spPr>
-            <a:xfrm>
-              <a:off x="4617444" y="1066052"/>
-              <a:ext cx="3962691" cy="369332"/>
-            </a:xfrm>
-            <a:prstGeom prst="rect">
-              <a:avLst/>
-            </a:prstGeom>
-            <a:noFill/>
-          </p:spPr>
-          <p:txBody>
-            <a:bodyPr wrap="square" rtlCol="0">
-              <a:spAutoFit/>
-            </a:bodyPr>
-            <a:lstStyle/>
-            <a:p>
-              <a:pPr algn="ctr"/>
-              <a:r>
-                <a:rPr lang="en-CA" b="1" dirty="0"/>
-                <a:t>Equipment command cache</a:t>
-              </a:r>
-            </a:p>
-          </p:txBody>
-        </p:sp>
-      </p:grpSp>
       <p:cxnSp>
         <p:nvCxnSpPr>
-          <p:cNvPr id="251" name="Connector: Curved 250">
-            <a:extLst>
-              <a:ext uri="{FF2B5EF4-FFF2-40B4-BE49-F238E27FC236}">
-                <a16:creationId xmlns:a16="http://schemas.microsoft.com/office/drawing/2014/main" id="{5A2862A9-39B0-4FAB-83C9-AC9D1B476AFA}"/>
+          <p:cNvPr id="255" name="Connector: Curved 254">
+            <a:extLst>
+              <a:ext uri="{FF2B5EF4-FFF2-40B4-BE49-F238E27FC236}">
+                <a16:creationId xmlns:a16="http://schemas.microsoft.com/office/drawing/2014/main" id="{EA7BC081-D733-4B34-ADA5-8D20B40E36FD}"/>
               </a:ext>
             </a:extLst>
           </p:cNvPr>
           <p:cNvCxnSpPr>
             <a:cxnSpLocks/>
-            <a:stCxn id="298" idx="2"/>
-            <a:endCxn id="374" idx="3"/>
+            <a:stCxn id="180" idx="2"/>
+            <a:endCxn id="175" idx="0"/>
           </p:cNvCxnSpPr>
           <p:nvPr/>
         </p:nvCxnSpPr>
         <p:spPr>
           <a:xfrm rot="5400000">
-            <a:off x="4971943" y="3208847"/>
-            <a:ext cx="1503360" cy="2231171"/>
+            <a:off x="6724880" y="1598241"/>
+            <a:ext cx="3335069" cy="5423972"/>
           </a:xfrm>
           <a:prstGeom prst="curvedConnector3">
             <a:avLst>
-              <a:gd name="adj1" fmla="val 19588"/>
+              <a:gd name="adj1" fmla="val 50000"/>
             </a:avLst>
           </a:prstGeom>
           <a:ln w="25400">
@@ -14260,246 +13992,6 @@
           </a:fontRef>
         </p:style>
       </p:cxnSp>
-      <p:cxnSp>
-        <p:nvCxnSpPr>
-          <p:cNvPr id="255" name="Connector: Curved 254">
-            <a:extLst>
-              <a:ext uri="{FF2B5EF4-FFF2-40B4-BE49-F238E27FC236}">
-                <a16:creationId xmlns:a16="http://schemas.microsoft.com/office/drawing/2014/main" id="{EA7BC081-D733-4B34-ADA5-8D20B40E36FD}"/>
-              </a:ext>
-            </a:extLst>
-          </p:cNvPr>
-          <p:cNvCxnSpPr>
-            <a:cxnSpLocks/>
-            <a:stCxn id="180" idx="2"/>
-            <a:endCxn id="375" idx="3"/>
-          </p:cNvCxnSpPr>
-          <p:nvPr/>
-        </p:nvCxnSpPr>
-        <p:spPr>
-          <a:xfrm rot="5400000">
-            <a:off x="7056357" y="1028730"/>
-            <a:ext cx="2434080" cy="5662006"/>
-          </a:xfrm>
-          <a:prstGeom prst="curvedConnector3">
-            <a:avLst>
-              <a:gd name="adj1" fmla="val 50000"/>
-            </a:avLst>
-          </a:prstGeom>
-          <a:ln w="25400">
-            <a:solidFill>
-              <a:schemeClr val="tx1"/>
-            </a:solidFill>
-            <a:tailEnd type="triangle"/>
-          </a:ln>
-        </p:spPr>
-        <p:style>
-          <a:lnRef idx="1">
-            <a:schemeClr val="accent1"/>
-          </a:lnRef>
-          <a:fillRef idx="0">
-            <a:schemeClr val="accent1"/>
-          </a:fillRef>
-          <a:effectRef idx="0">
-            <a:schemeClr val="accent1"/>
-          </a:effectRef>
-          <a:fontRef idx="minor">
-            <a:schemeClr val="tx1"/>
-          </a:fontRef>
-        </p:style>
-      </p:cxnSp>
-      <p:grpSp>
-        <p:nvGrpSpPr>
-          <p:cNvPr id="264" name="Group 263">
-            <a:extLst>
-              <a:ext uri="{FF2B5EF4-FFF2-40B4-BE49-F238E27FC236}">
-                <a16:creationId xmlns:a16="http://schemas.microsoft.com/office/drawing/2014/main" id="{F127FDF9-1B42-48A7-8260-503D463CF9C2}"/>
-              </a:ext>
-            </a:extLst>
-          </p:cNvPr>
-          <p:cNvGrpSpPr/>
-          <p:nvPr/>
-        </p:nvGrpSpPr>
-        <p:grpSpPr>
-          <a:xfrm>
-            <a:off x="4146806" y="5076112"/>
-            <a:ext cx="1756818" cy="248734"/>
-            <a:chOff x="4274379" y="5063206"/>
-            <a:chExt cx="1756818" cy="248734"/>
-          </a:xfrm>
-        </p:grpSpPr>
-        <p:sp>
-          <p:nvSpPr>
-            <p:cNvPr id="374" name="Rectangle: Rounded Corners 373">
-              <a:extLst>
-                <a:ext uri="{FF2B5EF4-FFF2-40B4-BE49-F238E27FC236}">
-                  <a16:creationId xmlns:a16="http://schemas.microsoft.com/office/drawing/2014/main" id="{FA9271FB-A833-43F6-9936-A50862F2C58C}"/>
-                </a:ext>
-              </a:extLst>
-            </p:cNvPr>
-            <p:cNvSpPr/>
-            <p:nvPr/>
-          </p:nvSpPr>
-          <p:spPr>
-            <a:xfrm rot="16200000">
-              <a:off x="4611573" y="4726012"/>
-              <a:ext cx="248073" cy="922461"/>
-            </a:xfrm>
-            <a:prstGeom prst="roundRect">
-              <a:avLst/>
-            </a:prstGeom>
-            <a:solidFill>
-              <a:schemeClr val="bg1">
-                <a:lumMod val="65000"/>
-                <a:alpha val="42000"/>
-              </a:schemeClr>
-            </a:solidFill>
-            <a:ln>
-              <a:solidFill>
-                <a:schemeClr val="tx1"/>
-              </a:solidFill>
-            </a:ln>
-          </p:spPr>
-          <p:style>
-            <a:lnRef idx="2">
-              <a:schemeClr val="accent1">
-                <a:shade val="50000"/>
-              </a:schemeClr>
-            </a:lnRef>
-            <a:fillRef idx="1">
-              <a:schemeClr val="accent1"/>
-            </a:fillRef>
-            <a:effectRef idx="0">
-              <a:schemeClr val="accent1"/>
-            </a:effectRef>
-            <a:fontRef idx="minor">
-              <a:schemeClr val="lt1"/>
-            </a:fontRef>
-          </p:style>
-          <p:txBody>
-            <a:bodyPr rtlCol="0" anchor="ctr"/>
-            <a:lstStyle/>
-            <a:p>
-              <a:pPr algn="ctr"/>
-              <a:endParaRPr lang="en-CA"/>
-            </a:p>
-          </p:txBody>
-        </p:sp>
-        <p:sp>
-          <p:nvSpPr>
-            <p:cNvPr id="375" name="Rectangle: Rounded Corners 374">
-              <a:extLst>
-                <a:ext uri="{FF2B5EF4-FFF2-40B4-BE49-F238E27FC236}">
-                  <a16:creationId xmlns:a16="http://schemas.microsoft.com/office/drawing/2014/main" id="{F240D609-218F-4969-B5F8-3E750AC3E573}"/>
-                </a:ext>
-              </a:extLst>
-            </p:cNvPr>
-            <p:cNvSpPr/>
-            <p:nvPr/>
-          </p:nvSpPr>
-          <p:spPr>
-            <a:xfrm rot="16200000">
-              <a:off x="5445930" y="4726673"/>
-              <a:ext cx="248073" cy="922461"/>
-            </a:xfrm>
-            <a:prstGeom prst="roundRect">
-              <a:avLst/>
-            </a:prstGeom>
-            <a:solidFill>
-              <a:schemeClr val="bg1">
-                <a:lumMod val="65000"/>
-                <a:alpha val="42000"/>
-              </a:schemeClr>
-            </a:solidFill>
-            <a:ln>
-              <a:solidFill>
-                <a:schemeClr val="tx1"/>
-              </a:solidFill>
-            </a:ln>
-          </p:spPr>
-          <p:style>
-            <a:lnRef idx="2">
-              <a:schemeClr val="accent1">
-                <a:shade val="50000"/>
-              </a:schemeClr>
-            </a:lnRef>
-            <a:fillRef idx="1">
-              <a:schemeClr val="accent1"/>
-            </a:fillRef>
-            <a:effectRef idx="0">
-              <a:schemeClr val="accent1"/>
-            </a:effectRef>
-            <a:fontRef idx="minor">
-              <a:schemeClr val="lt1"/>
-            </a:fontRef>
-          </p:style>
-          <p:txBody>
-            <a:bodyPr rtlCol="0" anchor="ctr"/>
-            <a:lstStyle/>
-            <a:p>
-              <a:pPr algn="ctr"/>
-              <a:endParaRPr lang="en-CA"/>
-            </a:p>
-          </p:txBody>
-        </p:sp>
-        <p:sp>
-          <p:nvSpPr>
-            <p:cNvPr id="388" name="Rectangle: Rounded Corners 387">
-              <a:extLst>
-                <a:ext uri="{FF2B5EF4-FFF2-40B4-BE49-F238E27FC236}">
-                  <a16:creationId xmlns:a16="http://schemas.microsoft.com/office/drawing/2014/main" id="{D753B009-F583-4084-9CF0-E6C23A1AD610}"/>
-                </a:ext>
-              </a:extLst>
-            </p:cNvPr>
-            <p:cNvSpPr/>
-            <p:nvPr/>
-          </p:nvSpPr>
-          <p:spPr>
-            <a:xfrm rot="16200000">
-              <a:off x="5043579" y="4726552"/>
-              <a:ext cx="248073" cy="922461"/>
-            </a:xfrm>
-            <a:prstGeom prst="roundRect">
-              <a:avLst/>
-            </a:prstGeom>
-            <a:solidFill>
-              <a:schemeClr val="bg1">
-                <a:lumMod val="65000"/>
-                <a:alpha val="42000"/>
-              </a:schemeClr>
-            </a:solidFill>
-            <a:ln>
-              <a:solidFill>
-                <a:schemeClr val="tx1"/>
-              </a:solidFill>
-            </a:ln>
-          </p:spPr>
-          <p:style>
-            <a:lnRef idx="2">
-              <a:schemeClr val="accent1">
-                <a:shade val="50000"/>
-              </a:schemeClr>
-            </a:lnRef>
-            <a:fillRef idx="1">
-              <a:schemeClr val="accent1"/>
-            </a:fillRef>
-            <a:effectRef idx="0">
-              <a:schemeClr val="accent1"/>
-            </a:effectRef>
-            <a:fontRef idx="minor">
-              <a:schemeClr val="lt1"/>
-            </a:fontRef>
-          </p:style>
-          <p:txBody>
-            <a:bodyPr rtlCol="0" anchor="ctr"/>
-            <a:lstStyle/>
-            <a:p>
-              <a:pPr algn="ctr"/>
-              <a:endParaRPr lang="en-CA"/>
-            </a:p>
-          </p:txBody>
-        </p:sp>
-      </p:grpSp>
       <p:grpSp>
         <p:nvGrpSpPr>
           <p:cNvPr id="396" name="Group 395">
@@ -14694,25 +14186,26 @@
       </p:grpSp>
       <p:cxnSp>
         <p:nvCxnSpPr>
-          <p:cNvPr id="270" name="Connector: Curved 269">
-            <a:extLst>
-              <a:ext uri="{FF2B5EF4-FFF2-40B4-BE49-F238E27FC236}">
-                <a16:creationId xmlns:a16="http://schemas.microsoft.com/office/drawing/2014/main" id="{B4665207-0C95-45D0-8646-397300994476}"/>
+          <p:cNvPr id="25" name="Straight Arrow Connector 24">
+            <a:extLst>
+              <a:ext uri="{FF2B5EF4-FFF2-40B4-BE49-F238E27FC236}">
+                <a16:creationId xmlns:a16="http://schemas.microsoft.com/office/drawing/2014/main" id="{1215FBEF-E512-48F6-A6B9-EE01B16499A9}"/>
               </a:ext>
             </a:extLst>
           </p:cNvPr>
           <p:cNvCxnSpPr>
-            <a:stCxn id="388" idx="1"/>
-            <a:endCxn id="175" idx="0"/>
+            <a:cxnSpLocks/>
+            <a:stCxn id="180" idx="3"/>
+            <a:endCxn id="345" idx="1"/>
           </p:cNvCxnSpPr>
           <p:nvPr/>
         </p:nvCxnSpPr>
         <p:spPr>
-          <a:xfrm rot="5400000">
-            <a:off x="4706112" y="5643830"/>
-            <a:ext cx="653037" cy="14827"/>
-          </a:xfrm>
-          <a:prstGeom prst="curvedConnector3">
+          <a:xfrm>
+            <a:off x="11940750" y="2056906"/>
+            <a:ext cx="817114" cy="0"/>
+          </a:xfrm>
+          <a:prstGeom prst="straightConnector1">
             <a:avLst/>
           </a:prstGeom>
           <a:ln w="25400">
@@ -14737,310 +14230,6 @@
           </a:fontRef>
         </p:style>
       </p:cxnSp>
-      <p:sp>
-        <p:nvSpPr>
-          <p:cNvPr id="406" name="Rectangle: Rounded Corners 405">
-            <a:extLst>
-              <a:ext uri="{FF2B5EF4-FFF2-40B4-BE49-F238E27FC236}">
-                <a16:creationId xmlns:a16="http://schemas.microsoft.com/office/drawing/2014/main" id="{1F96F516-062F-443A-9A8C-88D3B8268C80}"/>
-              </a:ext>
-            </a:extLst>
-          </p:cNvPr>
-          <p:cNvSpPr/>
-          <p:nvPr/>
-        </p:nvSpPr>
-        <p:spPr>
-          <a:xfrm>
-            <a:off x="4962877" y="2259812"/>
-            <a:ext cx="3760693" cy="1183076"/>
-          </a:xfrm>
-          <a:prstGeom prst="roundRect">
-            <a:avLst/>
-          </a:prstGeom>
-          <a:solidFill>
-            <a:schemeClr val="bg1">
-              <a:alpha val="41000"/>
-            </a:schemeClr>
-          </a:solidFill>
-          <a:ln>
-            <a:solidFill>
-              <a:schemeClr val="tx1"/>
-            </a:solidFill>
-          </a:ln>
-        </p:spPr>
-        <p:style>
-          <a:lnRef idx="2">
-            <a:schemeClr val="accent1">
-              <a:shade val="50000"/>
-            </a:schemeClr>
-          </a:lnRef>
-          <a:fillRef idx="1">
-            <a:schemeClr val="accent1"/>
-          </a:fillRef>
-          <a:effectRef idx="0">
-            <a:schemeClr val="accent1"/>
-          </a:effectRef>
-          <a:fontRef idx="minor">
-            <a:schemeClr val="lt1"/>
-          </a:fontRef>
-        </p:style>
-        <p:txBody>
-          <a:bodyPr rtlCol="0" anchor="ctr"/>
-          <a:lstStyle/>
-          <a:p>
-            <a:pPr algn="ctr"/>
-            <a:endParaRPr lang="en-CA"/>
-          </a:p>
-        </p:txBody>
-      </p:sp>
-      <p:sp>
-        <p:nvSpPr>
-          <p:cNvPr id="302" name="TextBox 301">
-            <a:extLst>
-              <a:ext uri="{FF2B5EF4-FFF2-40B4-BE49-F238E27FC236}">
-                <a16:creationId xmlns:a16="http://schemas.microsoft.com/office/drawing/2014/main" id="{6482FC5C-EFC6-4D2D-84F3-2CF43FBEFF19}"/>
-              </a:ext>
-            </a:extLst>
-          </p:cNvPr>
-          <p:cNvSpPr txBox="1"/>
-          <p:nvPr/>
-        </p:nvSpPr>
-        <p:spPr>
-          <a:xfrm>
-            <a:off x="5017284" y="2397269"/>
-            <a:ext cx="3702976" cy="954107"/>
-          </a:xfrm>
-          <a:prstGeom prst="rect">
-            <a:avLst/>
-          </a:prstGeom>
-          <a:noFill/>
-        </p:spPr>
-        <p:txBody>
-          <a:bodyPr wrap="square" rtlCol="0">
-            <a:spAutoFit/>
-          </a:bodyPr>
-          <a:lstStyle/>
-          <a:p>
-            <a:r>
-              <a:rPr lang="en-CA" sz="1400" b="1" dirty="0">
-                <a:solidFill>
-                  <a:srgbClr val="B21E92"/>
-                </a:solidFill>
-              </a:rPr>
-              <a:t>typedef</a:t>
-            </a:r>
-            <a:r>
-              <a:rPr lang="en-CA" sz="1400" dirty="0"/>
-              <a:t> </a:t>
-            </a:r>
-            <a:r>
-              <a:rPr lang="en-CA" sz="1400" b="1" dirty="0">
-                <a:solidFill>
-                  <a:srgbClr val="B21E92"/>
-                </a:solidFill>
-              </a:rPr>
-              <a:t>struct</a:t>
-            </a:r>
-            <a:r>
-              <a:rPr lang="en-CA" sz="1400" dirty="0"/>
-              <a:t>{</a:t>
-            </a:r>
-          </a:p>
-          <a:p>
-            <a:r>
-              <a:rPr lang="en-CA" sz="1400" dirty="0"/>
-              <a:t>	</a:t>
-            </a:r>
-            <a:r>
-              <a:rPr lang="en-CA" sz="1400" b="1" dirty="0">
-                <a:solidFill>
-                  <a:srgbClr val="B21E92"/>
-                </a:solidFill>
-              </a:rPr>
-              <a:t>float</a:t>
-            </a:r>
-            <a:r>
-              <a:rPr lang="en-CA" sz="1400" dirty="0"/>
-              <a:t> </a:t>
-            </a:r>
-            <a:r>
-              <a:rPr lang="en-CA" sz="1400" dirty="0" err="1"/>
-              <a:t>goalPosition</a:t>
-            </a:r>
-            <a:r>
-              <a:rPr lang="en-CA" sz="1400" dirty="0"/>
-              <a:t>;</a:t>
-            </a:r>
-          </a:p>
-          <a:p>
-            <a:r>
-              <a:rPr lang="en-CA" sz="1400" dirty="0"/>
-              <a:t>	uint8_t id;</a:t>
-            </a:r>
-          </a:p>
-          <a:p>
-            <a:r>
-              <a:rPr lang="en-CA" sz="1400" dirty="0"/>
-              <a:t>}</a:t>
-            </a:r>
-            <a:r>
-              <a:rPr lang="en-CA" sz="1400" b="1" dirty="0" err="1">
-                <a:solidFill>
-                  <a:schemeClr val="accent6">
-                    <a:lumMod val="50000"/>
-                  </a:schemeClr>
-                </a:solidFill>
-              </a:rPr>
-              <a:t>MotorGoal_t</a:t>
-            </a:r>
-            <a:r>
-              <a:rPr lang="en-CA" sz="1400" dirty="0"/>
-              <a:t>;</a:t>
-            </a:r>
-          </a:p>
-        </p:txBody>
-      </p:sp>
-      <p:sp>
-        <p:nvSpPr>
-          <p:cNvPr id="303" name="TextBox 302">
-            <a:extLst>
-              <a:ext uri="{FF2B5EF4-FFF2-40B4-BE49-F238E27FC236}">
-                <a16:creationId xmlns:a16="http://schemas.microsoft.com/office/drawing/2014/main" id="{C17D4CA0-B7D5-46B4-AF75-21D9FCB02C06}"/>
-              </a:ext>
-            </a:extLst>
-          </p:cNvPr>
-          <p:cNvSpPr txBox="1"/>
-          <p:nvPr/>
-        </p:nvSpPr>
-        <p:spPr>
-          <a:xfrm>
-            <a:off x="5293360" y="931644"/>
-            <a:ext cx="3149600" cy="481796"/>
-          </a:xfrm>
-          <a:prstGeom prst="rect">
-            <a:avLst/>
-          </a:prstGeom>
-          <a:noFill/>
-        </p:spPr>
-        <p:txBody>
-          <a:bodyPr wrap="square" rtlCol="0">
-            <a:spAutoFit/>
-          </a:bodyPr>
-          <a:lstStyle/>
-          <a:p>
-            <a:endParaRPr lang="en-CA" dirty="0"/>
-          </a:p>
-        </p:txBody>
-      </p:sp>
-      <p:sp>
-        <p:nvSpPr>
-          <p:cNvPr id="408" name="TextBox 407">
-            <a:extLst>
-              <a:ext uri="{FF2B5EF4-FFF2-40B4-BE49-F238E27FC236}">
-                <a16:creationId xmlns:a16="http://schemas.microsoft.com/office/drawing/2014/main" id="{65CB0BA5-512D-4E82-85C0-B239F4D93143}"/>
-              </a:ext>
-            </a:extLst>
-          </p:cNvPr>
-          <p:cNvSpPr txBox="1"/>
-          <p:nvPr/>
-        </p:nvSpPr>
-        <p:spPr>
-          <a:xfrm>
-            <a:off x="5089527" y="1116196"/>
-            <a:ext cx="3702976" cy="738664"/>
-          </a:xfrm>
-          <a:prstGeom prst="rect">
-            <a:avLst/>
-          </a:prstGeom>
-          <a:noFill/>
-        </p:spPr>
-        <p:txBody>
-          <a:bodyPr wrap="square" rtlCol="0">
-            <a:spAutoFit/>
-          </a:bodyPr>
-          <a:lstStyle/>
-          <a:p>
-            <a:r>
-              <a:rPr lang="en-CA" sz="1400" b="1" dirty="0">
-                <a:solidFill>
-                  <a:srgbClr val="B21E92"/>
-                </a:solidFill>
-              </a:rPr>
-              <a:t>typedef</a:t>
-            </a:r>
-            <a:r>
-              <a:rPr lang="en-CA" sz="1400" dirty="0"/>
-              <a:t> </a:t>
-            </a:r>
-            <a:r>
-              <a:rPr lang="en-CA" sz="1400" b="1" dirty="0">
-                <a:solidFill>
-                  <a:srgbClr val="B21E92"/>
-                </a:solidFill>
-              </a:rPr>
-              <a:t>struct</a:t>
-            </a:r>
-            <a:r>
-              <a:rPr lang="en-CA" sz="1400" dirty="0"/>
-              <a:t>{</a:t>
-            </a:r>
-          </a:p>
-          <a:p>
-            <a:r>
-              <a:rPr lang="en-CA" sz="1400" dirty="0"/>
-              <a:t>	</a:t>
-            </a:r>
-            <a:r>
-              <a:rPr lang="en-CA" sz="1400" b="1" dirty="0" err="1">
-                <a:solidFill>
-                  <a:schemeClr val="accent6">
-                    <a:lumMod val="50000"/>
-                  </a:schemeClr>
-                </a:solidFill>
-              </a:rPr>
-              <a:t>MotorGoal_t</a:t>
-            </a:r>
-            <a:r>
-              <a:rPr lang="en-CA" sz="1400" b="1" dirty="0">
-                <a:solidFill>
-                  <a:schemeClr val="accent6">
-                    <a:lumMod val="50000"/>
-                  </a:schemeClr>
-                </a:solidFill>
-              </a:rPr>
-              <a:t> </a:t>
-            </a:r>
-            <a:r>
-              <a:rPr lang="en-CA" sz="1400" dirty="0" err="1"/>
-              <a:t>motorGoals</a:t>
-            </a:r>
-            <a:r>
-              <a:rPr lang="en-CA" sz="1400" dirty="0"/>
-              <a:t>[18]</a:t>
-            </a:r>
-          </a:p>
-          <a:p>
-            <a:r>
-              <a:rPr lang="en-CA" sz="1400" dirty="0"/>
-              <a:t>}</a:t>
-            </a:r>
-            <a:r>
-              <a:rPr lang="en-CA" sz="1400" b="1" dirty="0" err="1">
-                <a:solidFill>
-                  <a:schemeClr val="accent6">
-                    <a:lumMod val="50000"/>
-                  </a:schemeClr>
-                </a:solidFill>
-              </a:rPr>
-              <a:t>EquipmentCommandCache_t</a:t>
-            </a:r>
-            <a:r>
-              <a:rPr lang="en-CA" sz="1400" dirty="0"/>
-              <a:t>;</a:t>
-            </a:r>
-          </a:p>
-        </p:txBody>
-      </p:sp>
     </p:spTree>
     <p:extLst>
       <p:ext uri="{BB962C8B-B14F-4D97-AF65-F5344CB8AC3E}">

</xml_diff>

<commit_message>
Revert "Revert "Pull master into UART hardware so that FreeRTOS functions can be used""
Former-commit-id: bc026f4c8e3427f08ded4b4e8cf7afa2375ce694 [formerly 9bccfb705443e1af4c5a05338031950e7103fafc]
Former-commit-id: 43b00761d8821bc7e8ff74a8f29478632505b4ee
</commit_message>
<xml_diff>
--- a/Robot/Doc/Media/Design_Future_2018/August-6-2018-Design_Full.pptx
+++ b/Robot/Doc/Media/Design_Future_2018/August-6-2018-Design_Full.pptx
@@ -243,7 +243,7 @@
           <a:p>
             <a:fld id="{661CBB55-5844-4F0B-9F21-ACF5478787D6}" type="datetimeFigureOut">
               <a:rPr lang="en-CA" smtClean="0"/>
-              <a:t>2018-08-06</a:t>
+              <a:t>2018-09-15</a:t>
             </a:fld>
             <a:endParaRPr lang="en-CA"/>
           </a:p>
@@ -413,7 +413,7 @@
           <a:p>
             <a:fld id="{661CBB55-5844-4F0B-9F21-ACF5478787D6}" type="datetimeFigureOut">
               <a:rPr lang="en-CA" smtClean="0"/>
-              <a:t>2018-08-06</a:t>
+              <a:t>2018-09-15</a:t>
             </a:fld>
             <a:endParaRPr lang="en-CA"/>
           </a:p>
@@ -593,7 +593,7 @@
           <a:p>
             <a:fld id="{661CBB55-5844-4F0B-9F21-ACF5478787D6}" type="datetimeFigureOut">
               <a:rPr lang="en-CA" smtClean="0"/>
-              <a:t>2018-08-06</a:t>
+              <a:t>2018-09-15</a:t>
             </a:fld>
             <a:endParaRPr lang="en-CA"/>
           </a:p>
@@ -763,7 +763,7 @@
           <a:p>
             <a:fld id="{661CBB55-5844-4F0B-9F21-ACF5478787D6}" type="datetimeFigureOut">
               <a:rPr lang="en-CA" smtClean="0"/>
-              <a:t>2018-08-06</a:t>
+              <a:t>2018-09-15</a:t>
             </a:fld>
             <a:endParaRPr lang="en-CA"/>
           </a:p>
@@ -1009,7 +1009,7 @@
           <a:p>
             <a:fld id="{661CBB55-5844-4F0B-9F21-ACF5478787D6}" type="datetimeFigureOut">
               <a:rPr lang="en-CA" smtClean="0"/>
-              <a:t>2018-08-06</a:t>
+              <a:t>2018-09-15</a:t>
             </a:fld>
             <a:endParaRPr lang="en-CA"/>
           </a:p>
@@ -1241,7 +1241,7 @@
           <a:p>
             <a:fld id="{661CBB55-5844-4F0B-9F21-ACF5478787D6}" type="datetimeFigureOut">
               <a:rPr lang="en-CA" smtClean="0"/>
-              <a:t>2018-08-06</a:t>
+              <a:t>2018-09-15</a:t>
             </a:fld>
             <a:endParaRPr lang="en-CA"/>
           </a:p>
@@ -1608,7 +1608,7 @@
           <a:p>
             <a:fld id="{661CBB55-5844-4F0B-9F21-ACF5478787D6}" type="datetimeFigureOut">
               <a:rPr lang="en-CA" smtClean="0"/>
-              <a:t>2018-08-06</a:t>
+              <a:t>2018-09-15</a:t>
             </a:fld>
             <a:endParaRPr lang="en-CA"/>
           </a:p>
@@ -1726,7 +1726,7 @@
           <a:p>
             <a:fld id="{661CBB55-5844-4F0B-9F21-ACF5478787D6}" type="datetimeFigureOut">
               <a:rPr lang="en-CA" smtClean="0"/>
-              <a:t>2018-08-06</a:t>
+              <a:t>2018-09-15</a:t>
             </a:fld>
             <a:endParaRPr lang="en-CA"/>
           </a:p>
@@ -1821,7 +1821,7 @@
           <a:p>
             <a:fld id="{661CBB55-5844-4F0B-9F21-ACF5478787D6}" type="datetimeFigureOut">
               <a:rPr lang="en-CA" smtClean="0"/>
-              <a:t>2018-08-06</a:t>
+              <a:t>2018-09-15</a:t>
             </a:fld>
             <a:endParaRPr lang="en-CA"/>
           </a:p>
@@ -2098,7 +2098,7 @@
           <a:p>
             <a:fld id="{661CBB55-5844-4F0B-9F21-ACF5478787D6}" type="datetimeFigureOut">
               <a:rPr lang="en-CA" smtClean="0"/>
-              <a:t>2018-08-06</a:t>
+              <a:t>2018-09-15</a:t>
             </a:fld>
             <a:endParaRPr lang="en-CA"/>
           </a:p>
@@ -2355,7 +2355,7 @@
           <a:p>
             <a:fld id="{661CBB55-5844-4F0B-9F21-ACF5478787D6}" type="datetimeFigureOut">
               <a:rPr lang="en-CA" smtClean="0"/>
-              <a:t>2018-08-06</a:t>
+              <a:t>2018-09-15</a:t>
             </a:fld>
             <a:endParaRPr lang="en-CA"/>
           </a:p>
@@ -2568,7 +2568,7 @@
           <a:p>
             <a:fld id="{661CBB55-5844-4F0B-9F21-ACF5478787D6}" type="datetimeFigureOut">
               <a:rPr lang="en-CA" smtClean="0"/>
-              <a:t>2018-08-06</a:t>
+              <a:t>2018-09-15</a:t>
             </a:fld>
             <a:endParaRPr lang="en-CA"/>
           </a:p>
@@ -9618,120 +9618,62 @@
           </a:p>
         </p:txBody>
       </p:sp>
-      <p:grpSp>
-        <p:nvGrpSpPr>
-          <p:cNvPr id="246" name="Group 245">
-            <a:extLst>
-              <a:ext uri="{FF2B5EF4-FFF2-40B4-BE49-F238E27FC236}">
-                <a16:creationId xmlns:a16="http://schemas.microsoft.com/office/drawing/2014/main" id="{6BB91E7F-C3FA-4C6B-884D-BD4CEB01E5BC}"/>
-              </a:ext>
-            </a:extLst>
-          </p:cNvPr>
-          <p:cNvGrpSpPr/>
-          <p:nvPr/>
-        </p:nvGrpSpPr>
-        <p:grpSpPr>
-          <a:xfrm>
-            <a:off x="4234324" y="5977762"/>
-            <a:ext cx="1581784" cy="1431489"/>
-            <a:chOff x="4234324" y="5977762"/>
-            <a:chExt cx="1581784" cy="1431489"/>
-          </a:xfrm>
-        </p:grpSpPr>
-        <p:sp>
-          <p:nvSpPr>
-            <p:cNvPr id="175" name="Rectangle: Rounded Corners 174">
-              <a:extLst>
-                <a:ext uri="{FF2B5EF4-FFF2-40B4-BE49-F238E27FC236}">
-                  <a16:creationId xmlns:a16="http://schemas.microsoft.com/office/drawing/2014/main" id="{3BDB3517-A51C-446D-953D-AF27BDB8653F}"/>
-                </a:ext>
-              </a:extLst>
-            </p:cNvPr>
-            <p:cNvSpPr/>
-            <p:nvPr/>
-          </p:nvSpPr>
-          <p:spPr>
-            <a:xfrm>
-              <a:off x="4234324" y="5977762"/>
-              <a:ext cx="1581784" cy="1431489"/>
-            </a:xfrm>
-            <a:prstGeom prst="roundRect">
-              <a:avLst/>
-            </a:prstGeom>
+      <p:sp>
+        <p:nvSpPr>
+          <p:cNvPr id="175" name="Rectangle: Rounded Corners 174">
+            <a:extLst>
+              <a:ext uri="{FF2B5EF4-FFF2-40B4-BE49-F238E27FC236}">
+                <a16:creationId xmlns:a16="http://schemas.microsoft.com/office/drawing/2014/main" id="{3BDB3517-A51C-446D-953D-AF27BDB8653F}"/>
+              </a:ext>
+            </a:extLst>
+          </p:cNvPr>
+          <p:cNvSpPr/>
+          <p:nvPr/>
+        </p:nvSpPr>
+        <p:spPr>
+          <a:xfrm>
+            <a:off x="5544747" y="5977762"/>
+            <a:ext cx="271361" cy="251953"/>
+          </a:xfrm>
+          <a:prstGeom prst="roundRect">
+            <a:avLst/>
+          </a:prstGeom>
+          <a:solidFill>
+            <a:schemeClr val="accent2">
+              <a:alpha val="42000"/>
+            </a:schemeClr>
+          </a:solidFill>
+          <a:ln>
             <a:solidFill>
-              <a:schemeClr val="bg1">
-                <a:lumMod val="65000"/>
-                <a:alpha val="42000"/>
-              </a:schemeClr>
+              <a:schemeClr val="tx1"/>
             </a:solidFill>
-            <a:ln>
-              <a:solidFill>
-                <a:schemeClr val="tx1"/>
-              </a:solidFill>
-            </a:ln>
-          </p:spPr>
-          <p:style>
-            <a:lnRef idx="2">
-              <a:schemeClr val="accent1">
-                <a:shade val="50000"/>
-              </a:schemeClr>
-            </a:lnRef>
-            <a:fillRef idx="1">
-              <a:schemeClr val="accent1"/>
-            </a:fillRef>
-            <a:effectRef idx="0">
-              <a:schemeClr val="accent1"/>
-            </a:effectRef>
-            <a:fontRef idx="minor">
-              <a:schemeClr val="lt1"/>
-            </a:fontRef>
-          </p:style>
-          <p:txBody>
-            <a:bodyPr rtlCol="0" anchor="ctr"/>
-            <a:lstStyle/>
-            <a:p>
-              <a:pPr algn="ctr"/>
-              <a:endParaRPr lang="en-CA"/>
-            </a:p>
-          </p:txBody>
-        </p:sp>
-        <p:sp>
-          <p:nvSpPr>
-            <p:cNvPr id="178" name="TextBox 177">
-              <a:extLst>
-                <a:ext uri="{FF2B5EF4-FFF2-40B4-BE49-F238E27FC236}">
-                  <a16:creationId xmlns:a16="http://schemas.microsoft.com/office/drawing/2014/main" id="{ED2E2D72-D452-4B2B-AF3E-6E197B9908C3}"/>
-                </a:ext>
-              </a:extLst>
-            </p:cNvPr>
-            <p:cNvSpPr txBox="1"/>
-            <p:nvPr/>
-          </p:nvSpPr>
-          <p:spPr>
-            <a:xfrm>
-              <a:off x="4234324" y="6008393"/>
-              <a:ext cx="1581784" cy="646331"/>
-            </a:xfrm>
-            <a:prstGeom prst="rect">
-              <a:avLst/>
-            </a:prstGeom>
-            <a:noFill/>
-          </p:spPr>
-          <p:txBody>
-            <a:bodyPr wrap="square" rtlCol="0">
-              <a:spAutoFit/>
-            </a:bodyPr>
-            <a:lstStyle/>
-            <a:p>
-              <a:pPr algn="ctr"/>
-              <a:r>
-                <a:rPr lang="en-CA" b="1" dirty="0"/>
-                <a:t>Equipment handler</a:t>
-              </a:r>
-            </a:p>
-          </p:txBody>
-        </p:sp>
-      </p:grpSp>
+          </a:ln>
+        </p:spPr>
+        <p:style>
+          <a:lnRef idx="2">
+            <a:schemeClr val="accent1">
+              <a:shade val="50000"/>
+            </a:schemeClr>
+          </a:lnRef>
+          <a:fillRef idx="1">
+            <a:schemeClr val="accent1"/>
+          </a:fillRef>
+          <a:effectRef idx="0">
+            <a:schemeClr val="accent1"/>
+          </a:effectRef>
+          <a:fontRef idx="minor">
+            <a:schemeClr val="lt1"/>
+          </a:fontRef>
+        </p:style>
+        <p:txBody>
+          <a:bodyPr rtlCol="0" anchor="ctr"/>
+          <a:lstStyle/>
+          <a:p>
+            <a:pPr algn="ctr"/>
+            <a:endParaRPr lang="en-CA"/>
+          </a:p>
+        </p:txBody>
+      </p:sp>
       <p:cxnSp>
         <p:nvCxnSpPr>
           <p:cNvPr id="179" name="Straight Arrow Connector 178">
@@ -9822,7 +9764,7 @@
             <a:pPr algn="ctr"/>
             <a:r>
               <a:rPr lang="en-CA" dirty="0"/>
-              <a:t>Update equipment command cache</a:t>
+              <a:t>Equipment handler</a:t>
             </a:r>
           </a:p>
         </p:txBody>
@@ -9933,20 +9875,19 @@
           </p:cNvPr>
           <p:cNvCxnSpPr>
             <a:cxnSpLocks/>
-            <a:stCxn id="178" idx="3"/>
+            <a:stCxn id="175" idx="0"/>
             <a:endCxn id="29" idx="0"/>
           </p:cNvCxnSpPr>
           <p:nvPr/>
         </p:nvCxnSpPr>
         <p:spPr>
-          <a:xfrm flipV="1">
-            <a:off x="5816108" y="5623701"/>
-            <a:ext cx="5653366" cy="707858"/>
-          </a:xfrm>
-          <a:prstGeom prst="curvedConnector4">
+          <a:xfrm rot="5400000" flipH="1" flipV="1">
+            <a:off x="8397921" y="2906209"/>
+            <a:ext cx="354061" cy="5789046"/>
+          </a:xfrm>
+          <a:prstGeom prst="curvedConnector3">
             <a:avLst>
-              <a:gd name="adj1" fmla="val 48036"/>
-              <a:gd name="adj2" fmla="val 256568"/>
+              <a:gd name="adj1" fmla="val 164565"/>
             </a:avLst>
           </a:prstGeom>
           <a:ln w="25400">
@@ -9982,20 +9923,19 @@
           </p:cNvPr>
           <p:cNvCxnSpPr>
             <a:cxnSpLocks/>
-            <a:stCxn id="178" idx="3"/>
+            <a:stCxn id="175" idx="0"/>
             <a:endCxn id="29" idx="0"/>
           </p:cNvCxnSpPr>
           <p:nvPr/>
         </p:nvCxnSpPr>
         <p:spPr>
-          <a:xfrm flipV="1">
-            <a:off x="5816108" y="5623701"/>
-            <a:ext cx="5653366" cy="707858"/>
-          </a:xfrm>
-          <a:prstGeom prst="curvedConnector4">
+          <a:xfrm rot="5400000" flipH="1" flipV="1">
+            <a:off x="8397921" y="2906209"/>
+            <a:ext cx="354061" cy="5789046"/>
+          </a:xfrm>
+          <a:prstGeom prst="curvedConnector3">
             <a:avLst>
-              <a:gd name="adj1" fmla="val 48036"/>
-              <a:gd name="adj2" fmla="val 235311"/>
+              <a:gd name="adj1" fmla="val 164565"/>
             </a:avLst>
           </a:prstGeom>
           <a:ln w="25400">
@@ -10031,20 +9971,19 @@
           </p:cNvPr>
           <p:cNvCxnSpPr>
             <a:cxnSpLocks/>
-            <a:stCxn id="178" idx="3"/>
+            <a:stCxn id="175" idx="0"/>
             <a:endCxn id="29" idx="0"/>
           </p:cNvCxnSpPr>
           <p:nvPr/>
         </p:nvCxnSpPr>
         <p:spPr>
-          <a:xfrm flipV="1">
-            <a:off x="5816108" y="5623701"/>
-            <a:ext cx="5653366" cy="707858"/>
-          </a:xfrm>
-          <a:prstGeom prst="curvedConnector4">
+          <a:xfrm rot="5400000" flipH="1" flipV="1">
+            <a:off x="8397921" y="2906209"/>
+            <a:ext cx="354061" cy="5789046"/>
+          </a:xfrm>
+          <a:prstGeom prst="curvedConnector3">
             <a:avLst>
-              <a:gd name="adj1" fmla="val 48036"/>
-              <a:gd name="adj2" fmla="val 269649"/>
+              <a:gd name="adj1" fmla="val 164565"/>
             </a:avLst>
           </a:prstGeom>
           <a:ln w="25400">
@@ -10087,12 +10026,12 @@
         </p:nvCxnSpPr>
         <p:spPr>
           <a:xfrm>
-            <a:off x="5816108" y="6693507"/>
-            <a:ext cx="5431238" cy="841722"/>
+            <a:off x="5816108" y="6103739"/>
+            <a:ext cx="5431238" cy="1431490"/>
           </a:xfrm>
           <a:prstGeom prst="curvedConnector3">
             <a:avLst>
-              <a:gd name="adj1" fmla="val 94335"/>
+              <a:gd name="adj1" fmla="val 50000"/>
             </a:avLst>
           </a:prstGeom>
           <a:ln w="25400">
@@ -10135,12 +10074,12 @@
         </p:nvCxnSpPr>
         <p:spPr>
           <a:xfrm>
-            <a:off x="5816108" y="6693507"/>
-            <a:ext cx="5431238" cy="841722"/>
+            <a:off x="5816108" y="6103739"/>
+            <a:ext cx="5431238" cy="1431490"/>
           </a:xfrm>
           <a:prstGeom prst="curvedConnector3">
             <a:avLst>
-              <a:gd name="adj1" fmla="val 90182"/>
+              <a:gd name="adj1" fmla="val 50000"/>
             </a:avLst>
           </a:prstGeom>
           <a:ln w="25400">
@@ -10183,12 +10122,12 @@
         </p:nvCxnSpPr>
         <p:spPr>
           <a:xfrm>
-            <a:off x="5816108" y="6693507"/>
-            <a:ext cx="5431238" cy="841722"/>
+            <a:off x="5816108" y="6103739"/>
+            <a:ext cx="5431238" cy="1431490"/>
           </a:xfrm>
           <a:prstGeom prst="curvedConnector3">
             <a:avLst>
-              <a:gd name="adj1" fmla="val 91977"/>
+              <a:gd name="adj1" fmla="val 50000"/>
             </a:avLst>
           </a:prstGeom>
           <a:ln w="25400">
@@ -10231,12 +10170,12 @@
         </p:nvCxnSpPr>
         <p:spPr>
           <a:xfrm rot="16200000" flipH="1">
-            <a:off x="6360689" y="6073778"/>
-            <a:ext cx="3773291" cy="6444236"/>
+            <a:off x="6098527" y="5811616"/>
+            <a:ext cx="4952827" cy="5789024"/>
           </a:xfrm>
           <a:prstGeom prst="curvedConnector3">
             <a:avLst>
-              <a:gd name="adj1" fmla="val 106058"/>
+              <a:gd name="adj1" fmla="val 104616"/>
             </a:avLst>
           </a:prstGeom>
           <a:ln w="25400">
@@ -10279,12 +10218,12 @@
         </p:nvCxnSpPr>
         <p:spPr>
           <a:xfrm rot="16200000" flipH="1">
-            <a:off x="6360689" y="6073778"/>
-            <a:ext cx="3773291" cy="6444236"/>
+            <a:off x="6098527" y="5811616"/>
+            <a:ext cx="4952827" cy="5789024"/>
           </a:xfrm>
           <a:prstGeom prst="curvedConnector3">
             <a:avLst>
-              <a:gd name="adj1" fmla="val 112193"/>
+              <a:gd name="adj1" fmla="val 104616"/>
             </a:avLst>
           </a:prstGeom>
           <a:ln w="25400">
@@ -10327,12 +10266,12 @@
         </p:nvCxnSpPr>
         <p:spPr>
           <a:xfrm rot="16200000" flipH="1">
-            <a:off x="6360689" y="6073778"/>
-            <a:ext cx="3773291" cy="6444236"/>
+            <a:off x="6098527" y="5811616"/>
+            <a:ext cx="4952827" cy="5789024"/>
           </a:xfrm>
           <a:prstGeom prst="curvedConnector3">
             <a:avLst>
-              <a:gd name="adj1" fmla="val 108512"/>
+              <a:gd name="adj1" fmla="val 104616"/>
             </a:avLst>
           </a:prstGeom>
           <a:ln w="25400">
@@ -10375,12 +10314,12 @@
         </p:nvCxnSpPr>
         <p:spPr>
           <a:xfrm rot="16200000" flipH="1">
-            <a:off x="5299116" y="7135350"/>
-            <a:ext cx="5896424" cy="6444225"/>
+            <a:off x="5036954" y="6873188"/>
+            <a:ext cx="7075960" cy="5789013"/>
           </a:xfrm>
           <a:prstGeom prst="curvedConnector3">
             <a:avLst>
-              <a:gd name="adj1" fmla="val 103877"/>
+              <a:gd name="adj1" fmla="val 103231"/>
             </a:avLst>
           </a:prstGeom>
           <a:ln w="25400">
@@ -10423,12 +10362,12 @@
         </p:nvCxnSpPr>
         <p:spPr>
           <a:xfrm rot="16200000" flipH="1">
-            <a:off x="5299116" y="7135350"/>
-            <a:ext cx="5896424" cy="6444225"/>
+            <a:off x="5036954" y="6873188"/>
+            <a:ext cx="7075960" cy="5789013"/>
           </a:xfrm>
           <a:prstGeom prst="curvedConnector3">
             <a:avLst>
-              <a:gd name="adj1" fmla="val 105447"/>
+              <a:gd name="adj1" fmla="val 103231"/>
             </a:avLst>
           </a:prstGeom>
           <a:ln w="25400">
@@ -10471,12 +10410,12 @@
         </p:nvCxnSpPr>
         <p:spPr>
           <a:xfrm rot="16200000" flipH="1">
-            <a:off x="5299116" y="7135350"/>
-            <a:ext cx="5896424" cy="6444225"/>
+            <a:off x="5036954" y="6873188"/>
+            <a:ext cx="7075960" cy="5789013"/>
           </a:xfrm>
           <a:prstGeom prst="curvedConnector3">
             <a:avLst>
-              <a:gd name="adj1" fmla="val 106821"/>
+              <a:gd name="adj1" fmla="val 103231"/>
             </a:avLst>
           </a:prstGeom>
           <a:ln w="25400">
@@ -10551,55 +10490,6 @@
           </a:fontRef>
         </p:style>
       </p:cxnSp>
-      <p:cxnSp>
-        <p:nvCxnSpPr>
-          <p:cNvPr id="286" name="Connector: Curved 285">
-            <a:extLst>
-              <a:ext uri="{FF2B5EF4-FFF2-40B4-BE49-F238E27FC236}">
-                <a16:creationId xmlns:a16="http://schemas.microsoft.com/office/drawing/2014/main" id="{4E643169-7FD8-4296-977E-3D4172C9B8FE}"/>
-              </a:ext>
-            </a:extLst>
-          </p:cNvPr>
-          <p:cNvCxnSpPr>
-            <a:cxnSpLocks/>
-            <a:stCxn id="180" idx="2"/>
-            <a:endCxn id="298" idx="3"/>
-          </p:cNvCxnSpPr>
-          <p:nvPr/>
-        </p:nvCxnSpPr>
-        <p:spPr>
-          <a:xfrm rot="5400000" flipH="1">
-            <a:off x="9748610" y="1286904"/>
-            <a:ext cx="585787" cy="2125793"/>
-          </a:xfrm>
-          <a:prstGeom prst="curvedConnector4">
-            <a:avLst>
-              <a:gd name="adj1" fmla="val -39024"/>
-              <a:gd name="adj2" fmla="val 69672"/>
-            </a:avLst>
-          </a:prstGeom>
-          <a:ln w="25400">
-            <a:solidFill>
-              <a:schemeClr val="tx1"/>
-            </a:solidFill>
-            <a:tailEnd type="triangle"/>
-          </a:ln>
-        </p:spPr>
-        <p:style>
-          <a:lnRef idx="1">
-            <a:schemeClr val="accent1"/>
-          </a:lnRef>
-          <a:fillRef idx="0">
-            <a:schemeClr val="accent1"/>
-          </a:fillRef>
-          <a:effectRef idx="0">
-            <a:schemeClr val="accent1"/>
-          </a:effectRef>
-          <a:fontRef idx="minor">
-            <a:schemeClr val="tx1"/>
-          </a:fontRef>
-        </p:style>
-      </p:cxnSp>
       <p:sp>
         <p:nvSpPr>
           <p:cNvPr id="345" name="Flowchart: Predefined Process 344">
@@ -10614,7 +10504,7 @@
         </p:nvSpPr>
         <p:spPr>
           <a:xfrm>
-            <a:off x="12757864" y="1435384"/>
+            <a:off x="12757864" y="1471118"/>
             <a:ext cx="1672701" cy="1171575"/>
           </a:xfrm>
           <a:prstGeom prst="flowChartPredefinedProcess">
@@ -10649,55 +10539,6 @@
           </a:p>
         </p:txBody>
       </p:sp>
-      <p:cxnSp>
-        <p:nvCxnSpPr>
-          <p:cNvPr id="367" name="Connector: Curved 366">
-            <a:extLst>
-              <a:ext uri="{FF2B5EF4-FFF2-40B4-BE49-F238E27FC236}">
-                <a16:creationId xmlns:a16="http://schemas.microsoft.com/office/drawing/2014/main" id="{A5ED6B20-ECD5-4ACC-82F4-6A4579E2B94D}"/>
-              </a:ext>
-            </a:extLst>
-          </p:cNvPr>
-          <p:cNvCxnSpPr>
-            <a:cxnSpLocks/>
-            <a:stCxn id="180" idx="2"/>
-            <a:endCxn id="345" idx="1"/>
-          </p:cNvCxnSpPr>
-          <p:nvPr/>
-        </p:nvCxnSpPr>
-        <p:spPr>
-          <a:xfrm rot="5400000" flipH="1" flipV="1">
-            <a:off x="11620371" y="1505201"/>
-            <a:ext cx="621521" cy="1653464"/>
-          </a:xfrm>
-          <a:prstGeom prst="curvedConnector4">
-            <a:avLst>
-              <a:gd name="adj1" fmla="val -163419"/>
-              <a:gd name="adj2" fmla="val 75291"/>
-            </a:avLst>
-          </a:prstGeom>
-          <a:ln w="25400">
-            <a:solidFill>
-              <a:schemeClr val="tx1"/>
-            </a:solidFill>
-            <a:tailEnd type="triangle"/>
-          </a:ln>
-        </p:spPr>
-        <p:style>
-          <a:lnRef idx="1">
-            <a:schemeClr val="accent1"/>
-          </a:lnRef>
-          <a:fillRef idx="0">
-            <a:schemeClr val="accent1"/>
-          </a:fillRef>
-          <a:effectRef idx="0">
-            <a:schemeClr val="accent1"/>
-          </a:effectRef>
-          <a:fontRef idx="minor">
-            <a:schemeClr val="tx1"/>
-          </a:fontRef>
-        </p:style>
-      </p:cxnSp>
       <p:sp>
         <p:nvSpPr>
           <p:cNvPr id="370" name="Rectangle: Rounded Corners 369">
@@ -11070,12 +10911,12 @@
         </p:nvCxnSpPr>
         <p:spPr>
           <a:xfrm rot="16200000" flipH="1">
-            <a:off x="16090017" y="111156"/>
-            <a:ext cx="2888988" cy="7880593"/>
+            <a:off x="16107884" y="129023"/>
+            <a:ext cx="2853254" cy="7880593"/>
           </a:xfrm>
           <a:prstGeom prst="curvedConnector3">
             <a:avLst>
-              <a:gd name="adj1" fmla="val 72724"/>
+              <a:gd name="adj1" fmla="val 50000"/>
             </a:avLst>
           </a:prstGeom>
           <a:ln w="25400">
@@ -11119,7 +10960,7 @@
         <p:spPr>
           <a:xfrm flipV="1">
             <a:off x="14430565" y="1652178"/>
-            <a:ext cx="4893965" cy="368994"/>
+            <a:ext cx="4893965" cy="404728"/>
           </a:xfrm>
           <a:prstGeom prst="curvedConnector3">
             <a:avLst>
@@ -12497,12 +12338,12 @@
         </p:nvCxnSpPr>
         <p:spPr>
           <a:xfrm>
-            <a:off x="5816108" y="6693507"/>
-            <a:ext cx="5428939" cy="2630641"/>
+            <a:off x="5816108" y="6103739"/>
+            <a:ext cx="5428939" cy="3220409"/>
           </a:xfrm>
           <a:prstGeom prst="curvedConnector3">
             <a:avLst>
-              <a:gd name="adj1" fmla="val 29414"/>
+              <a:gd name="adj1" fmla="val 50000"/>
             </a:avLst>
           </a:prstGeom>
           <a:ln w="25400">
@@ -12537,6 +12378,7 @@
             </a:extLst>
           </p:cNvPr>
           <p:cNvCxnSpPr>
+            <a:cxnSpLocks/>
             <a:stCxn id="175" idx="3"/>
             <a:endCxn id="195" idx="1"/>
           </p:cNvCxnSpPr>
@@ -12544,12 +12386,12 @@
         </p:nvCxnSpPr>
         <p:spPr>
           <a:xfrm>
-            <a:off x="5816108" y="6693507"/>
-            <a:ext cx="5428939" cy="2630641"/>
+            <a:off x="5816108" y="6103739"/>
+            <a:ext cx="5428939" cy="3220409"/>
           </a:xfrm>
           <a:prstGeom prst="curvedConnector3">
             <a:avLst>
-              <a:gd name="adj1" fmla="val 31473"/>
+              <a:gd name="adj1" fmla="val 50000"/>
             </a:avLst>
           </a:prstGeom>
           <a:ln w="25400">
@@ -12584,6 +12426,7 @@
             </a:extLst>
           </p:cNvPr>
           <p:cNvCxnSpPr>
+            <a:cxnSpLocks/>
             <a:stCxn id="175" idx="3"/>
             <a:endCxn id="195" idx="1"/>
           </p:cNvCxnSpPr>
@@ -12591,12 +12434,12 @@
         </p:nvCxnSpPr>
         <p:spPr>
           <a:xfrm>
-            <a:off x="5816108" y="6693507"/>
-            <a:ext cx="5428939" cy="2630641"/>
+            <a:off x="5816108" y="6103739"/>
+            <a:ext cx="5428939" cy="3220409"/>
           </a:xfrm>
           <a:prstGeom prst="curvedConnector3">
             <a:avLst>
-              <a:gd name="adj1" fmla="val 33531"/>
+              <a:gd name="adj1" fmla="val 50000"/>
             </a:avLst>
           </a:prstGeom>
           <a:ln w="25400">
@@ -12639,12 +12482,12 @@
         </p:nvCxnSpPr>
         <p:spPr>
           <a:xfrm>
-            <a:off x="5816108" y="6693507"/>
-            <a:ext cx="5428939" cy="2630641"/>
+            <a:off x="5816108" y="6103739"/>
+            <a:ext cx="5428939" cy="3220409"/>
           </a:xfrm>
           <a:prstGeom prst="curvedConnector3">
             <a:avLst>
-              <a:gd name="adj1" fmla="val 35515"/>
+              <a:gd name="adj1" fmla="val 50000"/>
             </a:avLst>
           </a:prstGeom>
           <a:ln w="25400">
@@ -12679,6 +12522,7 @@
             </a:extLst>
           </p:cNvPr>
           <p:cNvCxnSpPr>
+            <a:cxnSpLocks/>
             <a:stCxn id="175" idx="3"/>
             <a:endCxn id="195" idx="1"/>
           </p:cNvCxnSpPr>
@@ -12686,12 +12530,12 @@
         </p:nvCxnSpPr>
         <p:spPr>
           <a:xfrm>
-            <a:off x="5816108" y="6693507"/>
-            <a:ext cx="5428939" cy="2630641"/>
+            <a:off x="5816108" y="6103739"/>
+            <a:ext cx="5428939" cy="3220409"/>
           </a:xfrm>
           <a:prstGeom prst="curvedConnector3">
             <a:avLst>
-              <a:gd name="adj1" fmla="val 37087"/>
+              <a:gd name="adj1" fmla="val 50000"/>
             </a:avLst>
           </a:prstGeom>
           <a:ln w="25400">
@@ -12726,6 +12570,7 @@
             </a:extLst>
           </p:cNvPr>
           <p:cNvCxnSpPr>
+            <a:cxnSpLocks/>
             <a:stCxn id="175" idx="3"/>
             <a:endCxn id="195" idx="1"/>
           </p:cNvCxnSpPr>
@@ -12733,12 +12578,12 @@
         </p:nvCxnSpPr>
         <p:spPr>
           <a:xfrm>
-            <a:off x="5816108" y="6693507"/>
-            <a:ext cx="5428939" cy="2630641"/>
+            <a:off x="5816108" y="6103739"/>
+            <a:ext cx="5428939" cy="3220409"/>
           </a:xfrm>
           <a:prstGeom prst="curvedConnector3">
             <a:avLst>
-              <a:gd name="adj1" fmla="val 38771"/>
+              <a:gd name="adj1" fmla="val 50000"/>
             </a:avLst>
           </a:prstGeom>
           <a:ln w="25400">
@@ -14099,143 +13944,30 @@
           </p:txBody>
         </p:sp>
       </p:grpSp>
-      <p:grpSp>
-        <p:nvGrpSpPr>
-          <p:cNvPr id="149" name="Group 148">
-            <a:extLst>
-              <a:ext uri="{FF2B5EF4-FFF2-40B4-BE49-F238E27FC236}">
-                <a16:creationId xmlns:a16="http://schemas.microsoft.com/office/drawing/2014/main" id="{9C8A5ACC-0DA2-4E68-A3D3-7BB07A357D29}"/>
-              </a:ext>
-            </a:extLst>
-          </p:cNvPr>
-          <p:cNvGrpSpPr/>
-          <p:nvPr/>
-        </p:nvGrpSpPr>
-        <p:grpSpPr>
-          <a:xfrm>
-            <a:off x="4699808" y="541060"/>
-            <a:ext cx="4278799" cy="3031692"/>
-            <a:chOff x="4487440" y="1038459"/>
-            <a:chExt cx="4278799" cy="3080909"/>
-          </a:xfrm>
-        </p:grpSpPr>
-        <p:sp>
-          <p:nvSpPr>
-            <p:cNvPr id="298" name="Rectangle: Rounded Corners 297">
-              <a:extLst>
-                <a:ext uri="{FF2B5EF4-FFF2-40B4-BE49-F238E27FC236}">
-                  <a16:creationId xmlns:a16="http://schemas.microsoft.com/office/drawing/2014/main" id="{A9B9B68A-FC63-4F65-9744-E0BEA1775907}"/>
-                </a:ext>
-              </a:extLst>
-            </p:cNvPr>
-            <p:cNvSpPr/>
-            <p:nvPr/>
-          </p:nvSpPr>
-          <p:spPr>
-            <a:xfrm>
-              <a:off x="4487440" y="1038459"/>
-              <a:ext cx="4278799" cy="3080909"/>
-            </a:xfrm>
-            <a:prstGeom prst="roundRect">
-              <a:avLst/>
-            </a:prstGeom>
-            <a:solidFill>
-              <a:srgbClr val="7030A0">
-                <a:alpha val="42000"/>
-              </a:srgbClr>
-            </a:solidFill>
-            <a:ln>
-              <a:solidFill>
-                <a:schemeClr val="tx1"/>
-              </a:solidFill>
-            </a:ln>
-          </p:spPr>
-          <p:style>
-            <a:lnRef idx="2">
-              <a:schemeClr val="accent1">
-                <a:shade val="50000"/>
-              </a:schemeClr>
-            </a:lnRef>
-            <a:fillRef idx="1">
-              <a:schemeClr val="accent1"/>
-            </a:fillRef>
-            <a:effectRef idx="0">
-              <a:schemeClr val="accent1"/>
-            </a:effectRef>
-            <a:fontRef idx="minor">
-              <a:schemeClr val="lt1"/>
-            </a:fontRef>
-          </p:style>
-          <p:txBody>
-            <a:bodyPr rtlCol="0" anchor="ctr"/>
-            <a:lstStyle/>
-            <a:p>
-              <a:pPr algn="ctr"/>
-              <a:endParaRPr lang="en-CA" dirty="0"/>
-            </a:p>
-          </p:txBody>
-        </p:sp>
-        <p:sp>
-          <p:nvSpPr>
-            <p:cNvPr id="299" name="TextBox 298">
-              <a:extLst>
-                <a:ext uri="{FF2B5EF4-FFF2-40B4-BE49-F238E27FC236}">
-                  <a16:creationId xmlns:a16="http://schemas.microsoft.com/office/drawing/2014/main" id="{9E0DAE5F-D6E2-44D5-98C9-1328C8549D89}"/>
-                </a:ext>
-              </a:extLst>
-            </p:cNvPr>
-            <p:cNvSpPr txBox="1"/>
-            <p:nvPr/>
-          </p:nvSpPr>
-          <p:spPr>
-            <a:xfrm>
-              <a:off x="4617444" y="1066052"/>
-              <a:ext cx="3962691" cy="369332"/>
-            </a:xfrm>
-            <a:prstGeom prst="rect">
-              <a:avLst/>
-            </a:prstGeom>
-            <a:noFill/>
-          </p:spPr>
-          <p:txBody>
-            <a:bodyPr wrap="square" rtlCol="0">
-              <a:spAutoFit/>
-            </a:bodyPr>
-            <a:lstStyle/>
-            <a:p>
-              <a:pPr algn="ctr"/>
-              <a:r>
-                <a:rPr lang="en-CA" b="1" dirty="0"/>
-                <a:t>Equipment command cache</a:t>
-              </a:r>
-            </a:p>
-          </p:txBody>
-        </p:sp>
-      </p:grpSp>
       <p:cxnSp>
         <p:nvCxnSpPr>
-          <p:cNvPr id="251" name="Connector: Curved 250">
-            <a:extLst>
-              <a:ext uri="{FF2B5EF4-FFF2-40B4-BE49-F238E27FC236}">
-                <a16:creationId xmlns:a16="http://schemas.microsoft.com/office/drawing/2014/main" id="{5A2862A9-39B0-4FAB-83C9-AC9D1B476AFA}"/>
+          <p:cNvPr id="255" name="Connector: Curved 254">
+            <a:extLst>
+              <a:ext uri="{FF2B5EF4-FFF2-40B4-BE49-F238E27FC236}">
+                <a16:creationId xmlns:a16="http://schemas.microsoft.com/office/drawing/2014/main" id="{EA7BC081-D733-4B34-ADA5-8D20B40E36FD}"/>
               </a:ext>
             </a:extLst>
           </p:cNvPr>
           <p:cNvCxnSpPr>
             <a:cxnSpLocks/>
-            <a:stCxn id="298" idx="2"/>
-            <a:endCxn id="374" idx="3"/>
+            <a:stCxn id="180" idx="2"/>
+            <a:endCxn id="175" idx="0"/>
           </p:cNvCxnSpPr>
           <p:nvPr/>
         </p:nvCxnSpPr>
         <p:spPr>
           <a:xfrm rot="5400000">
-            <a:off x="4971943" y="3208847"/>
-            <a:ext cx="1503360" cy="2231171"/>
+            <a:off x="6724880" y="1598241"/>
+            <a:ext cx="3335069" cy="5423972"/>
           </a:xfrm>
           <a:prstGeom prst="curvedConnector3">
             <a:avLst>
-              <a:gd name="adj1" fmla="val 19588"/>
+              <a:gd name="adj1" fmla="val 50000"/>
             </a:avLst>
           </a:prstGeom>
           <a:ln w="25400">
@@ -14260,246 +13992,6 @@
           </a:fontRef>
         </p:style>
       </p:cxnSp>
-      <p:cxnSp>
-        <p:nvCxnSpPr>
-          <p:cNvPr id="255" name="Connector: Curved 254">
-            <a:extLst>
-              <a:ext uri="{FF2B5EF4-FFF2-40B4-BE49-F238E27FC236}">
-                <a16:creationId xmlns:a16="http://schemas.microsoft.com/office/drawing/2014/main" id="{EA7BC081-D733-4B34-ADA5-8D20B40E36FD}"/>
-              </a:ext>
-            </a:extLst>
-          </p:cNvPr>
-          <p:cNvCxnSpPr>
-            <a:cxnSpLocks/>
-            <a:stCxn id="180" idx="2"/>
-            <a:endCxn id="375" idx="3"/>
-          </p:cNvCxnSpPr>
-          <p:nvPr/>
-        </p:nvCxnSpPr>
-        <p:spPr>
-          <a:xfrm rot="5400000">
-            <a:off x="7056357" y="1028730"/>
-            <a:ext cx="2434080" cy="5662006"/>
-          </a:xfrm>
-          <a:prstGeom prst="curvedConnector3">
-            <a:avLst>
-              <a:gd name="adj1" fmla="val 50000"/>
-            </a:avLst>
-          </a:prstGeom>
-          <a:ln w="25400">
-            <a:solidFill>
-              <a:schemeClr val="tx1"/>
-            </a:solidFill>
-            <a:tailEnd type="triangle"/>
-          </a:ln>
-        </p:spPr>
-        <p:style>
-          <a:lnRef idx="1">
-            <a:schemeClr val="accent1"/>
-          </a:lnRef>
-          <a:fillRef idx="0">
-            <a:schemeClr val="accent1"/>
-          </a:fillRef>
-          <a:effectRef idx="0">
-            <a:schemeClr val="accent1"/>
-          </a:effectRef>
-          <a:fontRef idx="minor">
-            <a:schemeClr val="tx1"/>
-          </a:fontRef>
-        </p:style>
-      </p:cxnSp>
-      <p:grpSp>
-        <p:nvGrpSpPr>
-          <p:cNvPr id="264" name="Group 263">
-            <a:extLst>
-              <a:ext uri="{FF2B5EF4-FFF2-40B4-BE49-F238E27FC236}">
-                <a16:creationId xmlns:a16="http://schemas.microsoft.com/office/drawing/2014/main" id="{F127FDF9-1B42-48A7-8260-503D463CF9C2}"/>
-              </a:ext>
-            </a:extLst>
-          </p:cNvPr>
-          <p:cNvGrpSpPr/>
-          <p:nvPr/>
-        </p:nvGrpSpPr>
-        <p:grpSpPr>
-          <a:xfrm>
-            <a:off x="4146806" y="5076112"/>
-            <a:ext cx="1756818" cy="248734"/>
-            <a:chOff x="4274379" y="5063206"/>
-            <a:chExt cx="1756818" cy="248734"/>
-          </a:xfrm>
-        </p:grpSpPr>
-        <p:sp>
-          <p:nvSpPr>
-            <p:cNvPr id="374" name="Rectangle: Rounded Corners 373">
-              <a:extLst>
-                <a:ext uri="{FF2B5EF4-FFF2-40B4-BE49-F238E27FC236}">
-                  <a16:creationId xmlns:a16="http://schemas.microsoft.com/office/drawing/2014/main" id="{FA9271FB-A833-43F6-9936-A50862F2C58C}"/>
-                </a:ext>
-              </a:extLst>
-            </p:cNvPr>
-            <p:cNvSpPr/>
-            <p:nvPr/>
-          </p:nvSpPr>
-          <p:spPr>
-            <a:xfrm rot="16200000">
-              <a:off x="4611573" y="4726012"/>
-              <a:ext cx="248073" cy="922461"/>
-            </a:xfrm>
-            <a:prstGeom prst="roundRect">
-              <a:avLst/>
-            </a:prstGeom>
-            <a:solidFill>
-              <a:schemeClr val="bg1">
-                <a:lumMod val="65000"/>
-                <a:alpha val="42000"/>
-              </a:schemeClr>
-            </a:solidFill>
-            <a:ln>
-              <a:solidFill>
-                <a:schemeClr val="tx1"/>
-              </a:solidFill>
-            </a:ln>
-          </p:spPr>
-          <p:style>
-            <a:lnRef idx="2">
-              <a:schemeClr val="accent1">
-                <a:shade val="50000"/>
-              </a:schemeClr>
-            </a:lnRef>
-            <a:fillRef idx="1">
-              <a:schemeClr val="accent1"/>
-            </a:fillRef>
-            <a:effectRef idx="0">
-              <a:schemeClr val="accent1"/>
-            </a:effectRef>
-            <a:fontRef idx="minor">
-              <a:schemeClr val="lt1"/>
-            </a:fontRef>
-          </p:style>
-          <p:txBody>
-            <a:bodyPr rtlCol="0" anchor="ctr"/>
-            <a:lstStyle/>
-            <a:p>
-              <a:pPr algn="ctr"/>
-              <a:endParaRPr lang="en-CA"/>
-            </a:p>
-          </p:txBody>
-        </p:sp>
-        <p:sp>
-          <p:nvSpPr>
-            <p:cNvPr id="375" name="Rectangle: Rounded Corners 374">
-              <a:extLst>
-                <a:ext uri="{FF2B5EF4-FFF2-40B4-BE49-F238E27FC236}">
-                  <a16:creationId xmlns:a16="http://schemas.microsoft.com/office/drawing/2014/main" id="{F240D609-218F-4969-B5F8-3E750AC3E573}"/>
-                </a:ext>
-              </a:extLst>
-            </p:cNvPr>
-            <p:cNvSpPr/>
-            <p:nvPr/>
-          </p:nvSpPr>
-          <p:spPr>
-            <a:xfrm rot="16200000">
-              <a:off x="5445930" y="4726673"/>
-              <a:ext cx="248073" cy="922461"/>
-            </a:xfrm>
-            <a:prstGeom prst="roundRect">
-              <a:avLst/>
-            </a:prstGeom>
-            <a:solidFill>
-              <a:schemeClr val="bg1">
-                <a:lumMod val="65000"/>
-                <a:alpha val="42000"/>
-              </a:schemeClr>
-            </a:solidFill>
-            <a:ln>
-              <a:solidFill>
-                <a:schemeClr val="tx1"/>
-              </a:solidFill>
-            </a:ln>
-          </p:spPr>
-          <p:style>
-            <a:lnRef idx="2">
-              <a:schemeClr val="accent1">
-                <a:shade val="50000"/>
-              </a:schemeClr>
-            </a:lnRef>
-            <a:fillRef idx="1">
-              <a:schemeClr val="accent1"/>
-            </a:fillRef>
-            <a:effectRef idx="0">
-              <a:schemeClr val="accent1"/>
-            </a:effectRef>
-            <a:fontRef idx="minor">
-              <a:schemeClr val="lt1"/>
-            </a:fontRef>
-          </p:style>
-          <p:txBody>
-            <a:bodyPr rtlCol="0" anchor="ctr"/>
-            <a:lstStyle/>
-            <a:p>
-              <a:pPr algn="ctr"/>
-              <a:endParaRPr lang="en-CA"/>
-            </a:p>
-          </p:txBody>
-        </p:sp>
-        <p:sp>
-          <p:nvSpPr>
-            <p:cNvPr id="388" name="Rectangle: Rounded Corners 387">
-              <a:extLst>
-                <a:ext uri="{FF2B5EF4-FFF2-40B4-BE49-F238E27FC236}">
-                  <a16:creationId xmlns:a16="http://schemas.microsoft.com/office/drawing/2014/main" id="{D753B009-F583-4084-9CF0-E6C23A1AD610}"/>
-                </a:ext>
-              </a:extLst>
-            </p:cNvPr>
-            <p:cNvSpPr/>
-            <p:nvPr/>
-          </p:nvSpPr>
-          <p:spPr>
-            <a:xfrm rot="16200000">
-              <a:off x="5043579" y="4726552"/>
-              <a:ext cx="248073" cy="922461"/>
-            </a:xfrm>
-            <a:prstGeom prst="roundRect">
-              <a:avLst/>
-            </a:prstGeom>
-            <a:solidFill>
-              <a:schemeClr val="bg1">
-                <a:lumMod val="65000"/>
-                <a:alpha val="42000"/>
-              </a:schemeClr>
-            </a:solidFill>
-            <a:ln>
-              <a:solidFill>
-                <a:schemeClr val="tx1"/>
-              </a:solidFill>
-            </a:ln>
-          </p:spPr>
-          <p:style>
-            <a:lnRef idx="2">
-              <a:schemeClr val="accent1">
-                <a:shade val="50000"/>
-              </a:schemeClr>
-            </a:lnRef>
-            <a:fillRef idx="1">
-              <a:schemeClr val="accent1"/>
-            </a:fillRef>
-            <a:effectRef idx="0">
-              <a:schemeClr val="accent1"/>
-            </a:effectRef>
-            <a:fontRef idx="minor">
-              <a:schemeClr val="lt1"/>
-            </a:fontRef>
-          </p:style>
-          <p:txBody>
-            <a:bodyPr rtlCol="0" anchor="ctr"/>
-            <a:lstStyle/>
-            <a:p>
-              <a:pPr algn="ctr"/>
-              <a:endParaRPr lang="en-CA"/>
-            </a:p>
-          </p:txBody>
-        </p:sp>
-      </p:grpSp>
       <p:grpSp>
         <p:nvGrpSpPr>
           <p:cNvPr id="396" name="Group 395">
@@ -14694,25 +14186,26 @@
       </p:grpSp>
       <p:cxnSp>
         <p:nvCxnSpPr>
-          <p:cNvPr id="270" name="Connector: Curved 269">
-            <a:extLst>
-              <a:ext uri="{FF2B5EF4-FFF2-40B4-BE49-F238E27FC236}">
-                <a16:creationId xmlns:a16="http://schemas.microsoft.com/office/drawing/2014/main" id="{B4665207-0C95-45D0-8646-397300994476}"/>
+          <p:cNvPr id="25" name="Straight Arrow Connector 24">
+            <a:extLst>
+              <a:ext uri="{FF2B5EF4-FFF2-40B4-BE49-F238E27FC236}">
+                <a16:creationId xmlns:a16="http://schemas.microsoft.com/office/drawing/2014/main" id="{1215FBEF-E512-48F6-A6B9-EE01B16499A9}"/>
               </a:ext>
             </a:extLst>
           </p:cNvPr>
           <p:cNvCxnSpPr>
-            <a:stCxn id="388" idx="1"/>
-            <a:endCxn id="175" idx="0"/>
+            <a:cxnSpLocks/>
+            <a:stCxn id="180" idx="3"/>
+            <a:endCxn id="345" idx="1"/>
           </p:cNvCxnSpPr>
           <p:nvPr/>
         </p:nvCxnSpPr>
         <p:spPr>
-          <a:xfrm rot="5400000">
-            <a:off x="4706112" y="5643830"/>
-            <a:ext cx="653037" cy="14827"/>
-          </a:xfrm>
-          <a:prstGeom prst="curvedConnector3">
+          <a:xfrm>
+            <a:off x="11940750" y="2056906"/>
+            <a:ext cx="817114" cy="0"/>
+          </a:xfrm>
+          <a:prstGeom prst="straightConnector1">
             <a:avLst/>
           </a:prstGeom>
           <a:ln w="25400">
@@ -14737,310 +14230,6 @@
           </a:fontRef>
         </p:style>
       </p:cxnSp>
-      <p:sp>
-        <p:nvSpPr>
-          <p:cNvPr id="406" name="Rectangle: Rounded Corners 405">
-            <a:extLst>
-              <a:ext uri="{FF2B5EF4-FFF2-40B4-BE49-F238E27FC236}">
-                <a16:creationId xmlns:a16="http://schemas.microsoft.com/office/drawing/2014/main" id="{1F96F516-062F-443A-9A8C-88D3B8268C80}"/>
-              </a:ext>
-            </a:extLst>
-          </p:cNvPr>
-          <p:cNvSpPr/>
-          <p:nvPr/>
-        </p:nvSpPr>
-        <p:spPr>
-          <a:xfrm>
-            <a:off x="4962877" y="2259812"/>
-            <a:ext cx="3760693" cy="1183076"/>
-          </a:xfrm>
-          <a:prstGeom prst="roundRect">
-            <a:avLst/>
-          </a:prstGeom>
-          <a:solidFill>
-            <a:schemeClr val="bg1">
-              <a:alpha val="41000"/>
-            </a:schemeClr>
-          </a:solidFill>
-          <a:ln>
-            <a:solidFill>
-              <a:schemeClr val="tx1"/>
-            </a:solidFill>
-          </a:ln>
-        </p:spPr>
-        <p:style>
-          <a:lnRef idx="2">
-            <a:schemeClr val="accent1">
-              <a:shade val="50000"/>
-            </a:schemeClr>
-          </a:lnRef>
-          <a:fillRef idx="1">
-            <a:schemeClr val="accent1"/>
-          </a:fillRef>
-          <a:effectRef idx="0">
-            <a:schemeClr val="accent1"/>
-          </a:effectRef>
-          <a:fontRef idx="minor">
-            <a:schemeClr val="lt1"/>
-          </a:fontRef>
-        </p:style>
-        <p:txBody>
-          <a:bodyPr rtlCol="0" anchor="ctr"/>
-          <a:lstStyle/>
-          <a:p>
-            <a:pPr algn="ctr"/>
-            <a:endParaRPr lang="en-CA"/>
-          </a:p>
-        </p:txBody>
-      </p:sp>
-      <p:sp>
-        <p:nvSpPr>
-          <p:cNvPr id="302" name="TextBox 301">
-            <a:extLst>
-              <a:ext uri="{FF2B5EF4-FFF2-40B4-BE49-F238E27FC236}">
-                <a16:creationId xmlns:a16="http://schemas.microsoft.com/office/drawing/2014/main" id="{6482FC5C-EFC6-4D2D-84F3-2CF43FBEFF19}"/>
-              </a:ext>
-            </a:extLst>
-          </p:cNvPr>
-          <p:cNvSpPr txBox="1"/>
-          <p:nvPr/>
-        </p:nvSpPr>
-        <p:spPr>
-          <a:xfrm>
-            <a:off x="5017284" y="2397269"/>
-            <a:ext cx="3702976" cy="954107"/>
-          </a:xfrm>
-          <a:prstGeom prst="rect">
-            <a:avLst/>
-          </a:prstGeom>
-          <a:noFill/>
-        </p:spPr>
-        <p:txBody>
-          <a:bodyPr wrap="square" rtlCol="0">
-            <a:spAutoFit/>
-          </a:bodyPr>
-          <a:lstStyle/>
-          <a:p>
-            <a:r>
-              <a:rPr lang="en-CA" sz="1400" b="1" dirty="0">
-                <a:solidFill>
-                  <a:srgbClr val="B21E92"/>
-                </a:solidFill>
-              </a:rPr>
-              <a:t>typedef</a:t>
-            </a:r>
-            <a:r>
-              <a:rPr lang="en-CA" sz="1400" dirty="0"/>
-              <a:t> </a:t>
-            </a:r>
-            <a:r>
-              <a:rPr lang="en-CA" sz="1400" b="1" dirty="0">
-                <a:solidFill>
-                  <a:srgbClr val="B21E92"/>
-                </a:solidFill>
-              </a:rPr>
-              <a:t>struct</a:t>
-            </a:r>
-            <a:r>
-              <a:rPr lang="en-CA" sz="1400" dirty="0"/>
-              <a:t>{</a:t>
-            </a:r>
-          </a:p>
-          <a:p>
-            <a:r>
-              <a:rPr lang="en-CA" sz="1400" dirty="0"/>
-              <a:t>	</a:t>
-            </a:r>
-            <a:r>
-              <a:rPr lang="en-CA" sz="1400" b="1" dirty="0">
-                <a:solidFill>
-                  <a:srgbClr val="B21E92"/>
-                </a:solidFill>
-              </a:rPr>
-              <a:t>float</a:t>
-            </a:r>
-            <a:r>
-              <a:rPr lang="en-CA" sz="1400" dirty="0"/>
-              <a:t> </a:t>
-            </a:r>
-            <a:r>
-              <a:rPr lang="en-CA" sz="1400" dirty="0" err="1"/>
-              <a:t>goalPosition</a:t>
-            </a:r>
-            <a:r>
-              <a:rPr lang="en-CA" sz="1400" dirty="0"/>
-              <a:t>;</a:t>
-            </a:r>
-          </a:p>
-          <a:p>
-            <a:r>
-              <a:rPr lang="en-CA" sz="1400" dirty="0"/>
-              <a:t>	uint8_t id;</a:t>
-            </a:r>
-          </a:p>
-          <a:p>
-            <a:r>
-              <a:rPr lang="en-CA" sz="1400" dirty="0"/>
-              <a:t>}</a:t>
-            </a:r>
-            <a:r>
-              <a:rPr lang="en-CA" sz="1400" b="1" dirty="0" err="1">
-                <a:solidFill>
-                  <a:schemeClr val="accent6">
-                    <a:lumMod val="50000"/>
-                  </a:schemeClr>
-                </a:solidFill>
-              </a:rPr>
-              <a:t>MotorGoal_t</a:t>
-            </a:r>
-            <a:r>
-              <a:rPr lang="en-CA" sz="1400" dirty="0"/>
-              <a:t>;</a:t>
-            </a:r>
-          </a:p>
-        </p:txBody>
-      </p:sp>
-      <p:sp>
-        <p:nvSpPr>
-          <p:cNvPr id="303" name="TextBox 302">
-            <a:extLst>
-              <a:ext uri="{FF2B5EF4-FFF2-40B4-BE49-F238E27FC236}">
-                <a16:creationId xmlns:a16="http://schemas.microsoft.com/office/drawing/2014/main" id="{C17D4CA0-B7D5-46B4-AF75-21D9FCB02C06}"/>
-              </a:ext>
-            </a:extLst>
-          </p:cNvPr>
-          <p:cNvSpPr txBox="1"/>
-          <p:nvPr/>
-        </p:nvSpPr>
-        <p:spPr>
-          <a:xfrm>
-            <a:off x="5293360" y="931644"/>
-            <a:ext cx="3149600" cy="481796"/>
-          </a:xfrm>
-          <a:prstGeom prst="rect">
-            <a:avLst/>
-          </a:prstGeom>
-          <a:noFill/>
-        </p:spPr>
-        <p:txBody>
-          <a:bodyPr wrap="square" rtlCol="0">
-            <a:spAutoFit/>
-          </a:bodyPr>
-          <a:lstStyle/>
-          <a:p>
-            <a:endParaRPr lang="en-CA" dirty="0"/>
-          </a:p>
-        </p:txBody>
-      </p:sp>
-      <p:sp>
-        <p:nvSpPr>
-          <p:cNvPr id="408" name="TextBox 407">
-            <a:extLst>
-              <a:ext uri="{FF2B5EF4-FFF2-40B4-BE49-F238E27FC236}">
-                <a16:creationId xmlns:a16="http://schemas.microsoft.com/office/drawing/2014/main" id="{65CB0BA5-512D-4E82-85C0-B239F4D93143}"/>
-              </a:ext>
-            </a:extLst>
-          </p:cNvPr>
-          <p:cNvSpPr txBox="1"/>
-          <p:nvPr/>
-        </p:nvSpPr>
-        <p:spPr>
-          <a:xfrm>
-            <a:off x="5089527" y="1116196"/>
-            <a:ext cx="3702976" cy="738664"/>
-          </a:xfrm>
-          <a:prstGeom prst="rect">
-            <a:avLst/>
-          </a:prstGeom>
-          <a:noFill/>
-        </p:spPr>
-        <p:txBody>
-          <a:bodyPr wrap="square" rtlCol="0">
-            <a:spAutoFit/>
-          </a:bodyPr>
-          <a:lstStyle/>
-          <a:p>
-            <a:r>
-              <a:rPr lang="en-CA" sz="1400" b="1" dirty="0">
-                <a:solidFill>
-                  <a:srgbClr val="B21E92"/>
-                </a:solidFill>
-              </a:rPr>
-              <a:t>typedef</a:t>
-            </a:r>
-            <a:r>
-              <a:rPr lang="en-CA" sz="1400" dirty="0"/>
-              <a:t> </a:t>
-            </a:r>
-            <a:r>
-              <a:rPr lang="en-CA" sz="1400" b="1" dirty="0">
-                <a:solidFill>
-                  <a:srgbClr val="B21E92"/>
-                </a:solidFill>
-              </a:rPr>
-              <a:t>struct</a:t>
-            </a:r>
-            <a:r>
-              <a:rPr lang="en-CA" sz="1400" dirty="0"/>
-              <a:t>{</a:t>
-            </a:r>
-          </a:p>
-          <a:p>
-            <a:r>
-              <a:rPr lang="en-CA" sz="1400" dirty="0"/>
-              <a:t>	</a:t>
-            </a:r>
-            <a:r>
-              <a:rPr lang="en-CA" sz="1400" b="1" dirty="0" err="1">
-                <a:solidFill>
-                  <a:schemeClr val="accent6">
-                    <a:lumMod val="50000"/>
-                  </a:schemeClr>
-                </a:solidFill>
-              </a:rPr>
-              <a:t>MotorGoal_t</a:t>
-            </a:r>
-            <a:r>
-              <a:rPr lang="en-CA" sz="1400" b="1" dirty="0">
-                <a:solidFill>
-                  <a:schemeClr val="accent6">
-                    <a:lumMod val="50000"/>
-                  </a:schemeClr>
-                </a:solidFill>
-              </a:rPr>
-              <a:t> </a:t>
-            </a:r>
-            <a:r>
-              <a:rPr lang="en-CA" sz="1400" dirty="0" err="1"/>
-              <a:t>motorGoals</a:t>
-            </a:r>
-            <a:r>
-              <a:rPr lang="en-CA" sz="1400" dirty="0"/>
-              <a:t>[18]</a:t>
-            </a:r>
-          </a:p>
-          <a:p>
-            <a:r>
-              <a:rPr lang="en-CA" sz="1400" dirty="0"/>
-              <a:t>}</a:t>
-            </a:r>
-            <a:r>
-              <a:rPr lang="en-CA" sz="1400" b="1" dirty="0" err="1">
-                <a:solidFill>
-                  <a:schemeClr val="accent6">
-                    <a:lumMod val="50000"/>
-                  </a:schemeClr>
-                </a:solidFill>
-              </a:rPr>
-              <a:t>EquipmentCommandCache_t</a:t>
-            </a:r>
-            <a:r>
-              <a:rPr lang="en-CA" sz="1400" dirty="0"/>
-              <a:t>;</a:t>
-            </a:r>
-          </a:p>
-        </p:txBody>
-      </p:sp>
     </p:spTree>
     <p:extLst>
       <p:ext uri="{BB962C8B-B14F-4D97-AF65-F5344CB8AC3E}">

</xml_diff>